<commit_message>
added more info to project powerpoint slides
</commit_message>
<xml_diff>
--- a/QA SIMULATION PROJECT.pptx
+++ b/QA SIMULATION PROJECT.pptx
@@ -144,9 +144,178 @@
 <file path=ppt/revisionInfo.xml><?xml version="1.0" encoding="utf-8"?>
 <p1510:revInfo xmlns:a="http://schemas.openxmlformats.org/drawingml/2006/main" xmlns:r="http://schemas.openxmlformats.org/officeDocument/2006/relationships" xmlns:p1510="http://schemas.microsoft.com/office/powerpoint/2015/10/main">
   <p1510:revLst>
-    <p1510:client id="{4E3DB47F-F63B-4E08-A1B3-0841E5C020A8}" v="6" dt="2022-04-04T13:44:54.352"/>
+    <p1510:client id="{137866AE-ED74-4722-9C71-62FBFCDE4828}" v="1" dt="2022-04-04T14:36:13.904"/>
+    <p1510:client id="{8540A27E-136E-41B2-99AD-1F403120F84B}" v="1" dt="2022-04-05T06:00:27.209"/>
   </p1510:revLst>
 </p1510:revInfo>
+</file>
+
+<file path=ppt/changesInfos/changesInfo1.xml><?xml version="1.0" encoding="utf-8"?>
+<pc:chgInfo xmlns:a="http://schemas.openxmlformats.org/drawingml/2006/main" xmlns:r="http://schemas.openxmlformats.org/officeDocument/2006/relationships" xmlns:ac="http://schemas.microsoft.com/office/drawing/2013/main/command" xmlns:pc="http://schemas.microsoft.com/office/powerpoint/2013/main/command">
+  <pc:docChgLst>
+    <pc:chgData name="Viswanathan Nithya" userId="S::nithya.viswanathan@etteplan.com::0dec1170-f329-4562-a2ed-9d8f5bac8e79" providerId="AD" clId="Web-{8540A27E-136E-41B2-99AD-1F403120F84B}"/>
+    <pc:docChg chg="modSld">
+      <pc:chgData name="Viswanathan Nithya" userId="S::nithya.viswanathan@etteplan.com::0dec1170-f329-4562-a2ed-9d8f5bac8e79" providerId="AD" clId="Web-{8540A27E-136E-41B2-99AD-1F403120F84B}" dt="2022-04-05T06:00:27.209" v="0" actId="1076"/>
+      <pc:docMkLst>
+        <pc:docMk/>
+      </pc:docMkLst>
+      <pc:sldChg chg="modSp">
+        <pc:chgData name="Viswanathan Nithya" userId="S::nithya.viswanathan@etteplan.com::0dec1170-f329-4562-a2ed-9d8f5bac8e79" providerId="AD" clId="Web-{8540A27E-136E-41B2-99AD-1F403120F84B}" dt="2022-04-05T06:00:27.209" v="0" actId="1076"/>
+        <pc:sldMkLst>
+          <pc:docMk/>
+          <pc:sldMk cId="503814389" sldId="321"/>
+        </pc:sldMkLst>
+        <pc:picChg chg="mod">
+          <ac:chgData name="Viswanathan Nithya" userId="S::nithya.viswanathan@etteplan.com::0dec1170-f329-4562-a2ed-9d8f5bac8e79" providerId="AD" clId="Web-{8540A27E-136E-41B2-99AD-1F403120F84B}" dt="2022-04-05T06:00:27.209" v="0" actId="1076"/>
+          <ac:picMkLst>
+            <pc:docMk/>
+            <pc:sldMk cId="503814389" sldId="321"/>
+            <ac:picMk id="8" creationId="{64DB8914-A697-4444-9BA7-2FACE1B79FDC}"/>
+          </ac:picMkLst>
+        </pc:picChg>
+      </pc:sldChg>
+    </pc:docChg>
+  </pc:docChgLst>
+  <pc:docChgLst>
+    <pc:chgData name="Basnet Suman" userId="5fcd8753-7e29-47a8-b6ee-19d08df533d1" providerId="ADAL" clId="{137866AE-ED74-4722-9C71-62FBFCDE4828}"/>
+    <pc:docChg chg="undo custSel addSld delSld modSld">
+      <pc:chgData name="Basnet Suman" userId="5fcd8753-7e29-47a8-b6ee-19d08df533d1" providerId="ADAL" clId="{137866AE-ED74-4722-9C71-62FBFCDE4828}" dt="2022-04-05T05:23:15.528" v="122" actId="20577"/>
+      <pc:docMkLst>
+        <pc:docMk/>
+      </pc:docMkLst>
+      <pc:sldChg chg="modSp mod">
+        <pc:chgData name="Basnet Suman" userId="5fcd8753-7e29-47a8-b6ee-19d08df533d1" providerId="ADAL" clId="{137866AE-ED74-4722-9C71-62FBFCDE4828}" dt="2022-04-05T05:23:15.528" v="122" actId="20577"/>
+        <pc:sldMkLst>
+          <pc:docMk/>
+          <pc:sldMk cId="2102008283" sldId="314"/>
+        </pc:sldMkLst>
+        <pc:spChg chg="mod">
+          <ac:chgData name="Basnet Suman" userId="5fcd8753-7e29-47a8-b6ee-19d08df533d1" providerId="ADAL" clId="{137866AE-ED74-4722-9C71-62FBFCDE4828}" dt="2022-04-05T05:23:15.528" v="122" actId="20577"/>
+          <ac:spMkLst>
+            <pc:docMk/>
+            <pc:sldMk cId="2102008283" sldId="314"/>
+            <ac:spMk id="4" creationId="{2DCB6E70-F6DC-497B-868C-79F5AF957354}"/>
+          </ac:spMkLst>
+        </pc:spChg>
+      </pc:sldChg>
+      <pc:sldChg chg="addSp modSp mod">
+        <pc:chgData name="Basnet Suman" userId="5fcd8753-7e29-47a8-b6ee-19d08df533d1" providerId="ADAL" clId="{137866AE-ED74-4722-9C71-62FBFCDE4828}" dt="2022-04-04T14:37:02.934" v="48" actId="14100"/>
+        <pc:sldMkLst>
+          <pc:docMk/>
+          <pc:sldMk cId="601310387" sldId="316"/>
+        </pc:sldMkLst>
+        <pc:picChg chg="add mod">
+          <ac:chgData name="Basnet Suman" userId="5fcd8753-7e29-47a8-b6ee-19d08df533d1" providerId="ADAL" clId="{137866AE-ED74-4722-9C71-62FBFCDE4828}" dt="2022-04-04T14:37:02.934" v="48" actId="14100"/>
+          <ac:picMkLst>
+            <pc:docMk/>
+            <pc:sldMk cId="601310387" sldId="316"/>
+            <ac:picMk id="5" creationId="{AA17B9F7-9684-4489-83D8-F747F27AEBF0}"/>
+          </ac:picMkLst>
+        </pc:picChg>
+      </pc:sldChg>
+      <pc:sldChg chg="addSp modSp mod">
+        <pc:chgData name="Basnet Suman" userId="5fcd8753-7e29-47a8-b6ee-19d08df533d1" providerId="ADAL" clId="{137866AE-ED74-4722-9C71-62FBFCDE4828}" dt="2022-04-04T14:14:11.994" v="5" actId="14100"/>
+        <pc:sldMkLst>
+          <pc:docMk/>
+          <pc:sldMk cId="155834458" sldId="320"/>
+        </pc:sldMkLst>
+        <pc:picChg chg="add mod">
+          <ac:chgData name="Basnet Suman" userId="5fcd8753-7e29-47a8-b6ee-19d08df533d1" providerId="ADAL" clId="{137866AE-ED74-4722-9C71-62FBFCDE4828}" dt="2022-04-04T14:14:11.994" v="5" actId="14100"/>
+          <ac:picMkLst>
+            <pc:docMk/>
+            <pc:sldMk cId="155834458" sldId="320"/>
+            <ac:picMk id="6" creationId="{FF51A94E-E4C4-431A-81E6-CBD9442723CB}"/>
+          </ac:picMkLst>
+        </pc:picChg>
+      </pc:sldChg>
+      <pc:sldChg chg="addSp delSp modSp mod">
+        <pc:chgData name="Basnet Suman" userId="5fcd8753-7e29-47a8-b6ee-19d08df533d1" providerId="ADAL" clId="{137866AE-ED74-4722-9C71-62FBFCDE4828}" dt="2022-04-04T14:31:05.403" v="22" actId="1076"/>
+        <pc:sldMkLst>
+          <pc:docMk/>
+          <pc:sldMk cId="503814389" sldId="321"/>
+        </pc:sldMkLst>
+        <pc:picChg chg="add del mod">
+          <ac:chgData name="Basnet Suman" userId="5fcd8753-7e29-47a8-b6ee-19d08df533d1" providerId="ADAL" clId="{137866AE-ED74-4722-9C71-62FBFCDE4828}" dt="2022-04-04T14:30:58.886" v="20" actId="478"/>
+          <ac:picMkLst>
+            <pc:docMk/>
+            <pc:sldMk cId="503814389" sldId="321"/>
+            <ac:picMk id="6" creationId="{0F5E3611-3311-47BD-B6A4-B0BBF19AC9AB}"/>
+          </ac:picMkLst>
+        </pc:picChg>
+        <pc:picChg chg="add mod">
+          <ac:chgData name="Basnet Suman" userId="5fcd8753-7e29-47a8-b6ee-19d08df533d1" providerId="ADAL" clId="{137866AE-ED74-4722-9C71-62FBFCDE4828}" dt="2022-04-04T14:31:05.403" v="22" actId="1076"/>
+          <ac:picMkLst>
+            <pc:docMk/>
+            <pc:sldMk cId="503814389" sldId="321"/>
+            <ac:picMk id="8" creationId="{64DB8914-A697-4444-9BA7-2FACE1B79FDC}"/>
+          </ac:picMkLst>
+        </pc:picChg>
+      </pc:sldChg>
+      <pc:sldChg chg="addSp delSp modSp mod">
+        <pc:chgData name="Basnet Suman" userId="5fcd8753-7e29-47a8-b6ee-19d08df533d1" providerId="ADAL" clId="{137866AE-ED74-4722-9C71-62FBFCDE4828}" dt="2022-04-04T14:34:34.610" v="24" actId="1076"/>
+        <pc:sldMkLst>
+          <pc:docMk/>
+          <pc:sldMk cId="1125811932" sldId="322"/>
+        </pc:sldMkLst>
+        <pc:picChg chg="add del mod">
+          <ac:chgData name="Basnet Suman" userId="5fcd8753-7e29-47a8-b6ee-19d08df533d1" providerId="ADAL" clId="{137866AE-ED74-4722-9C71-62FBFCDE4828}" dt="2022-04-04T14:30:50.648" v="19" actId="22"/>
+          <ac:picMkLst>
+            <pc:docMk/>
+            <pc:sldMk cId="1125811932" sldId="322"/>
+            <ac:picMk id="6" creationId="{BFD95C37-9E5A-4D0C-BF0E-E9EE17C19828}"/>
+          </ac:picMkLst>
+        </pc:picChg>
+        <pc:picChg chg="add mod">
+          <ac:chgData name="Basnet Suman" userId="5fcd8753-7e29-47a8-b6ee-19d08df533d1" providerId="ADAL" clId="{137866AE-ED74-4722-9C71-62FBFCDE4828}" dt="2022-04-04T14:34:34.610" v="24" actId="1076"/>
+          <ac:picMkLst>
+            <pc:docMk/>
+            <pc:sldMk cId="1125811932" sldId="322"/>
+            <ac:picMk id="8" creationId="{CCD9848D-0ACA-4A96-9D62-62EF15FD5207}"/>
+          </ac:picMkLst>
+        </pc:picChg>
+      </pc:sldChg>
+      <pc:sldChg chg="addSp delSp modSp new del mod">
+        <pc:chgData name="Basnet Suman" userId="5fcd8753-7e29-47a8-b6ee-19d08df533d1" providerId="ADAL" clId="{137866AE-ED74-4722-9C71-62FBFCDE4828}" dt="2022-04-04T14:36:09.429" v="37" actId="47"/>
+        <pc:sldMkLst>
+          <pc:docMk/>
+          <pc:sldMk cId="921830061" sldId="324"/>
+        </pc:sldMkLst>
+        <pc:spChg chg="mod">
+          <ac:chgData name="Basnet Suman" userId="5fcd8753-7e29-47a8-b6ee-19d08df533d1" providerId="ADAL" clId="{137866AE-ED74-4722-9C71-62FBFCDE4828}" dt="2022-04-04T14:35:12.175" v="32" actId="20577"/>
+          <ac:spMkLst>
+            <pc:docMk/>
+            <pc:sldMk cId="921830061" sldId="324"/>
+            <ac:spMk id="2" creationId="{767B13FF-E497-416C-B5B2-258521DE591F}"/>
+          </ac:spMkLst>
+        </pc:spChg>
+        <pc:spChg chg="del">
+          <ac:chgData name="Basnet Suman" userId="5fcd8753-7e29-47a8-b6ee-19d08df533d1" providerId="ADAL" clId="{137866AE-ED74-4722-9C71-62FBFCDE4828}" dt="2022-04-04T14:35:44.847" v="33" actId="22"/>
+          <ac:spMkLst>
+            <pc:docMk/>
+            <pc:sldMk cId="921830061" sldId="324"/>
+            <ac:spMk id="3" creationId="{BB9E043F-862A-482F-9768-FF650209C6DC}"/>
+          </ac:spMkLst>
+        </pc:spChg>
+        <pc:spChg chg="add mod">
+          <ac:chgData name="Basnet Suman" userId="5fcd8753-7e29-47a8-b6ee-19d08df533d1" providerId="ADAL" clId="{137866AE-ED74-4722-9C71-62FBFCDE4828}" dt="2022-04-04T14:36:07.741" v="36" actId="21"/>
+          <ac:spMkLst>
+            <pc:docMk/>
+            <pc:sldMk cId="921830061" sldId="324"/>
+            <ac:spMk id="8" creationId="{F87C48CA-1FB9-4101-A3E0-B544E3ED990A}"/>
+          </ac:spMkLst>
+        </pc:spChg>
+        <pc:picChg chg="add del mod ord">
+          <ac:chgData name="Basnet Suman" userId="5fcd8753-7e29-47a8-b6ee-19d08df533d1" providerId="ADAL" clId="{137866AE-ED74-4722-9C71-62FBFCDE4828}" dt="2022-04-04T14:36:07.741" v="36" actId="21"/>
+          <ac:picMkLst>
+            <pc:docMk/>
+            <pc:sldMk cId="921830061" sldId="324"/>
+            <ac:picMk id="6" creationId="{44B18E16-C76B-43FF-93B4-02740CD061AA}"/>
+          </ac:picMkLst>
+        </pc:picChg>
+      </pc:sldChg>
+    </pc:docChg>
+  </pc:docChgLst>
+</pc:chgInfo>
 </file>
 
 <file path=ppt/handoutMasters/handoutMaster1.xml><?xml version="1.0" encoding="utf-8"?>
@@ -9635,6 +9804,51 @@
           <a:p>
             <a:endParaRPr lang="en-GB" dirty="0"/>
           </a:p>
+          <a:p>
+            <a:endParaRPr lang="en-GB" dirty="0"/>
+          </a:p>
+          <a:p>
+            <a:endParaRPr lang="en-GB" dirty="0"/>
+          </a:p>
+          <a:p>
+            <a:endParaRPr lang="en-GB" dirty="0"/>
+          </a:p>
+          <a:p>
+            <a:endParaRPr lang="en-GB" dirty="0"/>
+          </a:p>
+          <a:p>
+            <a:r>
+              <a:rPr lang="en-GB" dirty="0"/>
+              <a:t>Nithya Viswanathan</a:t>
+            </a:r>
+          </a:p>
+          <a:p>
+            <a:r>
+              <a:rPr lang="en-GB" dirty="0" err="1"/>
+              <a:t>Sekar</a:t>
+            </a:r>
+            <a:r>
+              <a:rPr lang="en-GB" dirty="0"/>
+              <a:t> Gayathri</a:t>
+            </a:r>
+          </a:p>
+          <a:p>
+            <a:r>
+              <a:rPr lang="en-GB" dirty="0"/>
+              <a:t>Lauri </a:t>
+            </a:r>
+            <a:r>
+              <a:rPr lang="en-GB" dirty="0" err="1"/>
+              <a:t>Kyttälä</a:t>
+            </a:r>
+            <a:endParaRPr lang="en-GB" dirty="0"/>
+          </a:p>
+          <a:p>
+            <a:r>
+              <a:rPr lang="en-GB" dirty="0"/>
+              <a:t>Suman Basnet</a:t>
+            </a:r>
+          </a:p>
         </p:txBody>
       </p:sp>
       <p:sp>
@@ -10045,6 +10259,36 @@
           </a:p>
         </p:txBody>
       </p:sp>
+      <p:pic>
+        <p:nvPicPr>
+          <p:cNvPr id="5" name="Content Placeholder 5">
+            <a:extLst>
+              <a:ext uri="{FF2B5EF4-FFF2-40B4-BE49-F238E27FC236}">
+                <a16:creationId xmlns:a16="http://schemas.microsoft.com/office/drawing/2014/main" id="{AA17B9F7-9684-4489-83D8-F747F27AEBF0}"/>
+              </a:ext>
+            </a:extLst>
+          </p:cNvPr>
+          <p:cNvPicPr>
+            <a:picLocks noChangeAspect="1"/>
+          </p:cNvPicPr>
+          <p:nvPr/>
+        </p:nvPicPr>
+        <p:blipFill>
+          <a:blip r:embed="rId2"/>
+          <a:stretch>
+            <a:fillRect/>
+          </a:stretch>
+        </p:blipFill>
+        <p:spPr>
+          <a:xfrm>
+            <a:off x="5606950" y="745724"/>
+            <a:ext cx="5748098" cy="2570872"/>
+          </a:xfrm>
+          <a:prstGeom prst="rect">
+            <a:avLst/>
+          </a:prstGeom>
+        </p:spPr>
+      </p:pic>
     </p:spTree>
     <p:extLst>
       <p:ext uri="{BB962C8B-B14F-4D97-AF65-F5344CB8AC3E}">
@@ -10171,6 +10415,18 @@
             <a:pPr marL="0" indent="0">
               <a:buNone/>
             </a:pPr>
+            <a:endParaRPr lang="en-US" dirty="0"/>
+          </a:p>
+          <a:p>
+            <a:pPr marL="0" indent="0">
+              <a:buNone/>
+            </a:pPr>
+            <a:endParaRPr lang="en-US" dirty="0"/>
+          </a:p>
+          <a:p>
+            <a:pPr marL="0" indent="0">
+              <a:buNone/>
+            </a:pPr>
             <a:r>
               <a:rPr lang="en-US" dirty="0"/>
               <a:t>Test levels</a:t>
@@ -10244,6 +10500,36 @@
           </a:p>
         </p:txBody>
       </p:sp>
+      <p:pic>
+        <p:nvPicPr>
+          <p:cNvPr id="6" name="Picture 5">
+            <a:extLst>
+              <a:ext uri="{FF2B5EF4-FFF2-40B4-BE49-F238E27FC236}">
+                <a16:creationId xmlns:a16="http://schemas.microsoft.com/office/drawing/2014/main" id="{1BD02590-E2D0-4A74-9CCE-79E9D923684B}"/>
+              </a:ext>
+            </a:extLst>
+          </p:cNvPr>
+          <p:cNvPicPr>
+            <a:picLocks noChangeAspect="1"/>
+          </p:cNvPicPr>
+          <p:nvPr/>
+        </p:nvPicPr>
+        <p:blipFill>
+          <a:blip r:embed="rId2"/>
+          <a:stretch>
+            <a:fillRect/>
+          </a:stretch>
+        </p:blipFill>
+        <p:spPr>
+          <a:xfrm>
+            <a:off x="597878" y="2124683"/>
+            <a:ext cx="6189784" cy="2743741"/>
+          </a:xfrm>
+          <a:prstGeom prst="rect">
+            <a:avLst/>
+          </a:prstGeom>
+        </p:spPr>
+      </p:pic>
     </p:spTree>
     <p:extLst>
       <p:ext uri="{BB962C8B-B14F-4D97-AF65-F5344CB8AC3E}">
@@ -10350,6 +10636,12 @@
             </a:r>
           </a:p>
           <a:p>
+            <a:pPr marL="0" indent="0">
+              <a:buNone/>
+            </a:pPr>
+            <a:endParaRPr lang="en-US" dirty="0"/>
+          </a:p>
+          <a:p>
             <a:endParaRPr lang="en-US" dirty="0"/>
           </a:p>
           <a:p>
@@ -10476,6 +10768,36 @@
           </a:p>
         </p:txBody>
       </p:sp>
+      <p:pic>
+        <p:nvPicPr>
+          <p:cNvPr id="6" name="Picture 5">
+            <a:extLst>
+              <a:ext uri="{FF2B5EF4-FFF2-40B4-BE49-F238E27FC236}">
+                <a16:creationId xmlns:a16="http://schemas.microsoft.com/office/drawing/2014/main" id="{EFAF6813-877C-4FB1-8097-2A0657EC097A}"/>
+              </a:ext>
+            </a:extLst>
+          </p:cNvPr>
+          <p:cNvPicPr>
+            <a:picLocks noChangeAspect="1"/>
+          </p:cNvPicPr>
+          <p:nvPr/>
+        </p:nvPicPr>
+        <p:blipFill>
+          <a:blip r:embed="rId2"/>
+          <a:stretch>
+            <a:fillRect/>
+          </a:stretch>
+        </p:blipFill>
+        <p:spPr>
+          <a:xfrm>
+            <a:off x="4866968" y="857993"/>
+            <a:ext cx="7024995" cy="3025750"/>
+          </a:xfrm>
+          <a:prstGeom prst="rect">
+            <a:avLst/>
+          </a:prstGeom>
+        </p:spPr>
+      </p:pic>
     </p:spTree>
     <p:extLst>
       <p:ext uri="{BB962C8B-B14F-4D97-AF65-F5344CB8AC3E}">
@@ -10678,6 +11000,36 @@
           </a:p>
         </p:txBody>
       </p:sp>
+      <p:pic>
+        <p:nvPicPr>
+          <p:cNvPr id="6" name="Picture 5">
+            <a:extLst>
+              <a:ext uri="{FF2B5EF4-FFF2-40B4-BE49-F238E27FC236}">
+                <a16:creationId xmlns:a16="http://schemas.microsoft.com/office/drawing/2014/main" id="{FF51A94E-E4C4-431A-81E6-CBD9442723CB}"/>
+              </a:ext>
+            </a:extLst>
+          </p:cNvPr>
+          <p:cNvPicPr>
+            <a:picLocks noChangeAspect="1"/>
+          </p:cNvPicPr>
+          <p:nvPr/>
+        </p:nvPicPr>
+        <p:blipFill>
+          <a:blip r:embed="rId2"/>
+          <a:stretch>
+            <a:fillRect/>
+          </a:stretch>
+        </p:blipFill>
+        <p:spPr>
+          <a:xfrm>
+            <a:off x="4709652" y="1020095"/>
+            <a:ext cx="5663380" cy="3207776"/>
+          </a:xfrm>
+          <a:prstGeom prst="rect">
+            <a:avLst/>
+          </a:prstGeom>
+        </p:spPr>
+      </p:pic>
     </p:spTree>
     <p:extLst>
       <p:ext uri="{BB962C8B-B14F-4D97-AF65-F5344CB8AC3E}">
@@ -10933,6 +11285,36 @@
           </a:p>
         </p:txBody>
       </p:sp>
+      <p:pic>
+        <p:nvPicPr>
+          <p:cNvPr id="8" name="Picture 7">
+            <a:extLst>
+              <a:ext uri="{FF2B5EF4-FFF2-40B4-BE49-F238E27FC236}">
+                <a16:creationId xmlns:a16="http://schemas.microsoft.com/office/drawing/2014/main" id="{64DB8914-A697-4444-9BA7-2FACE1B79FDC}"/>
+              </a:ext>
+            </a:extLst>
+          </p:cNvPr>
+          <p:cNvPicPr>
+            <a:picLocks noChangeAspect="1"/>
+          </p:cNvPicPr>
+          <p:nvPr/>
+        </p:nvPicPr>
+        <p:blipFill>
+          <a:blip r:embed="rId2"/>
+          <a:stretch>
+            <a:fillRect/>
+          </a:stretch>
+        </p:blipFill>
+        <p:spPr>
+          <a:xfrm>
+            <a:off x="5358810" y="1040721"/>
+            <a:ext cx="6267450" cy="2857500"/>
+          </a:xfrm>
+          <a:prstGeom prst="rect">
+            <a:avLst/>
+          </a:prstGeom>
+        </p:spPr>
+      </p:pic>
     </p:spTree>
     <p:extLst>
       <p:ext uri="{BB962C8B-B14F-4D97-AF65-F5344CB8AC3E}">
@@ -11187,6 +11569,36 @@
           </a:p>
         </p:txBody>
       </p:sp>
+      <p:pic>
+        <p:nvPicPr>
+          <p:cNvPr id="8" name="Picture 7">
+            <a:extLst>
+              <a:ext uri="{FF2B5EF4-FFF2-40B4-BE49-F238E27FC236}">
+                <a16:creationId xmlns:a16="http://schemas.microsoft.com/office/drawing/2014/main" id="{CCD9848D-0ACA-4A96-9D62-62EF15FD5207}"/>
+              </a:ext>
+            </a:extLst>
+          </p:cNvPr>
+          <p:cNvPicPr>
+            <a:picLocks noChangeAspect="1"/>
+          </p:cNvPicPr>
+          <p:nvPr/>
+        </p:nvPicPr>
+        <p:blipFill>
+          <a:blip r:embed="rId2"/>
+          <a:stretch>
+            <a:fillRect/>
+          </a:stretch>
+        </p:blipFill>
+        <p:spPr>
+          <a:xfrm>
+            <a:off x="4814888" y="856481"/>
+            <a:ext cx="6753225" cy="2962275"/>
+          </a:xfrm>
+          <a:prstGeom prst="rect">
+            <a:avLst/>
+          </a:prstGeom>
+        </p:spPr>
+      </p:pic>
     </p:spTree>
     <p:extLst>
       <p:ext uri="{BB962C8B-B14F-4D97-AF65-F5344CB8AC3E}">
@@ -12102,18 +12514,18 @@
 </file>
 
 <file path=customXml/item1.xml><?xml version="1.0" encoding="utf-8"?>
-<p:properties xmlns:p="http://schemas.microsoft.com/office/2006/metadata/properties" xmlns:xsi="http://www.w3.org/2001/XMLSchema-instance" xmlns:pc="http://schemas.microsoft.com/office/infopath/2007/PartnerControls">
-  <documentManagement/>
-</p:properties>
-</file>
-
-<file path=customXml/item2.xml><?xml version="1.0" encoding="utf-8"?>
 <?mso-contentType ?>
 <FormTemplates xmlns="http://schemas.microsoft.com/sharepoint/v3/contenttype/forms">
   <Display>DocumentLibraryForm</Display>
   <Edit>DocumentLibraryForm</Edit>
   <New>DocumentLibraryForm</New>
 </FormTemplates>
+</file>
+
+<file path=customXml/item2.xml><?xml version="1.0" encoding="utf-8"?>
+<p:properties xmlns:p="http://schemas.microsoft.com/office/2006/metadata/properties" xmlns:xsi="http://www.w3.org/2001/XMLSchema-instance" xmlns:pc="http://schemas.microsoft.com/office/infopath/2007/PartnerControls">
+  <documentManagement/>
+</p:properties>
 </file>
 
 <file path=customXml/item3.xml><?xml version="1.0" encoding="utf-8"?>
@@ -12314,6 +12726,14 @@
 </file>
 
 <file path=customXml/itemProps1.xml><?xml version="1.0" encoding="utf-8"?>
+<ds:datastoreItem xmlns:ds="http://schemas.openxmlformats.org/officeDocument/2006/customXml" ds:itemID="{BAE466B8-72B2-4A90-80DF-05EB5AFED783}">
+  <ds:schemaRefs>
+    <ds:schemaRef ds:uri="http://schemas.microsoft.com/sharepoint/v3/contenttype/forms"/>
+  </ds:schemaRefs>
+</ds:datastoreItem>
+</file>
+
+<file path=customXml/itemProps2.xml><?xml version="1.0" encoding="utf-8"?>
 <ds:datastoreItem xmlns:ds="http://schemas.openxmlformats.org/officeDocument/2006/customXml" ds:itemID="{12155729-2BCB-47EF-AA23-D89073AFCE32}">
   <ds:schemaRefs>
     <ds:schemaRef ds:uri="http://schemas.microsoft.com/office/infopath/2007/PartnerControls"/>
@@ -12326,14 +12746,6 @@
     <ds:schemaRef ds:uri="http://schemas.openxmlformats.org/package/2006/metadata/core-properties"/>
     <ds:schemaRef ds:uri="http://purl.org/dc/dcmitype/"/>
     <ds:schemaRef ds:uri="http://schemas.microsoft.com/office/2006/metadata/properties"/>
-  </ds:schemaRefs>
-</ds:datastoreItem>
-</file>
-
-<file path=customXml/itemProps2.xml><?xml version="1.0" encoding="utf-8"?>
-<ds:datastoreItem xmlns:ds="http://schemas.openxmlformats.org/officeDocument/2006/customXml" ds:itemID="{BAE466B8-72B2-4A90-80DF-05EB5AFED783}">
-  <ds:schemaRefs>
-    <ds:schemaRef ds:uri="http://schemas.microsoft.com/sharepoint/v3/contenttype/forms"/>
   </ds:schemaRefs>
 </ds:datastoreItem>
 </file>

</xml_diff>

<commit_message>
done additiong to PP slides
</commit_message>
<xml_diff>
--- a/QA SIMULATION PROJECT.pptx
+++ b/QA SIMULATION PROJECT.pptx
@@ -5,10 +5,10 @@
     <p:sldMasterId id="2147483722" r:id="rId4"/>
   </p:sldMasterIdLst>
   <p:notesMasterIdLst>
-    <p:notesMasterId r:id="rId15"/>
+    <p:notesMasterId r:id="rId17"/>
   </p:notesMasterIdLst>
   <p:handoutMasterIdLst>
-    <p:handoutMasterId r:id="rId16"/>
+    <p:handoutMasterId r:id="rId18"/>
   </p:handoutMasterIdLst>
   <p:sldIdLst>
     <p:sldId id="314" r:id="rId5"/>
@@ -19,8 +19,10 @@
     <p:sldId id="320" r:id="rId10"/>
     <p:sldId id="321" r:id="rId11"/>
     <p:sldId id="322" r:id="rId12"/>
-    <p:sldId id="323" r:id="rId13"/>
-    <p:sldId id="270" r:id="rId14"/>
+    <p:sldId id="324" r:id="rId13"/>
+    <p:sldId id="323" r:id="rId14"/>
+    <p:sldId id="325" r:id="rId15"/>
+    <p:sldId id="270" r:id="rId16"/>
   </p:sldIdLst>
   <p:sldSz cx="12190413" cy="6858000"/>
   <p:notesSz cx="6858000" cy="9144000"/>
@@ -150,174 +152,6 @@
 </p1510:revInfo>
 </file>
 
-<file path=ppt/changesInfos/changesInfo1.xml><?xml version="1.0" encoding="utf-8"?>
-<pc:chgInfo xmlns:a="http://schemas.openxmlformats.org/drawingml/2006/main" xmlns:r="http://schemas.openxmlformats.org/officeDocument/2006/relationships" xmlns:ac="http://schemas.microsoft.com/office/drawing/2013/main/command" xmlns:pc="http://schemas.microsoft.com/office/powerpoint/2013/main/command">
-  <pc:docChgLst>
-    <pc:chgData name="Viswanathan Nithya" userId="S::nithya.viswanathan@etteplan.com::0dec1170-f329-4562-a2ed-9d8f5bac8e79" providerId="AD" clId="Web-{8540A27E-136E-41B2-99AD-1F403120F84B}"/>
-    <pc:docChg chg="modSld">
-      <pc:chgData name="Viswanathan Nithya" userId="S::nithya.viswanathan@etteplan.com::0dec1170-f329-4562-a2ed-9d8f5bac8e79" providerId="AD" clId="Web-{8540A27E-136E-41B2-99AD-1F403120F84B}" dt="2022-04-05T06:00:27.209" v="0" actId="1076"/>
-      <pc:docMkLst>
-        <pc:docMk/>
-      </pc:docMkLst>
-      <pc:sldChg chg="modSp">
-        <pc:chgData name="Viswanathan Nithya" userId="S::nithya.viswanathan@etteplan.com::0dec1170-f329-4562-a2ed-9d8f5bac8e79" providerId="AD" clId="Web-{8540A27E-136E-41B2-99AD-1F403120F84B}" dt="2022-04-05T06:00:27.209" v="0" actId="1076"/>
-        <pc:sldMkLst>
-          <pc:docMk/>
-          <pc:sldMk cId="503814389" sldId="321"/>
-        </pc:sldMkLst>
-        <pc:picChg chg="mod">
-          <ac:chgData name="Viswanathan Nithya" userId="S::nithya.viswanathan@etteplan.com::0dec1170-f329-4562-a2ed-9d8f5bac8e79" providerId="AD" clId="Web-{8540A27E-136E-41B2-99AD-1F403120F84B}" dt="2022-04-05T06:00:27.209" v="0" actId="1076"/>
-          <ac:picMkLst>
-            <pc:docMk/>
-            <pc:sldMk cId="503814389" sldId="321"/>
-            <ac:picMk id="8" creationId="{64DB8914-A697-4444-9BA7-2FACE1B79FDC}"/>
-          </ac:picMkLst>
-        </pc:picChg>
-      </pc:sldChg>
-    </pc:docChg>
-  </pc:docChgLst>
-  <pc:docChgLst>
-    <pc:chgData name="Basnet Suman" userId="5fcd8753-7e29-47a8-b6ee-19d08df533d1" providerId="ADAL" clId="{137866AE-ED74-4722-9C71-62FBFCDE4828}"/>
-    <pc:docChg chg="undo custSel addSld delSld modSld">
-      <pc:chgData name="Basnet Suman" userId="5fcd8753-7e29-47a8-b6ee-19d08df533d1" providerId="ADAL" clId="{137866AE-ED74-4722-9C71-62FBFCDE4828}" dt="2022-04-05T05:23:15.528" v="122" actId="20577"/>
-      <pc:docMkLst>
-        <pc:docMk/>
-      </pc:docMkLst>
-      <pc:sldChg chg="modSp mod">
-        <pc:chgData name="Basnet Suman" userId="5fcd8753-7e29-47a8-b6ee-19d08df533d1" providerId="ADAL" clId="{137866AE-ED74-4722-9C71-62FBFCDE4828}" dt="2022-04-05T05:23:15.528" v="122" actId="20577"/>
-        <pc:sldMkLst>
-          <pc:docMk/>
-          <pc:sldMk cId="2102008283" sldId="314"/>
-        </pc:sldMkLst>
-        <pc:spChg chg="mod">
-          <ac:chgData name="Basnet Suman" userId="5fcd8753-7e29-47a8-b6ee-19d08df533d1" providerId="ADAL" clId="{137866AE-ED74-4722-9C71-62FBFCDE4828}" dt="2022-04-05T05:23:15.528" v="122" actId="20577"/>
-          <ac:spMkLst>
-            <pc:docMk/>
-            <pc:sldMk cId="2102008283" sldId="314"/>
-            <ac:spMk id="4" creationId="{2DCB6E70-F6DC-497B-868C-79F5AF957354}"/>
-          </ac:spMkLst>
-        </pc:spChg>
-      </pc:sldChg>
-      <pc:sldChg chg="addSp modSp mod">
-        <pc:chgData name="Basnet Suman" userId="5fcd8753-7e29-47a8-b6ee-19d08df533d1" providerId="ADAL" clId="{137866AE-ED74-4722-9C71-62FBFCDE4828}" dt="2022-04-04T14:37:02.934" v="48" actId="14100"/>
-        <pc:sldMkLst>
-          <pc:docMk/>
-          <pc:sldMk cId="601310387" sldId="316"/>
-        </pc:sldMkLst>
-        <pc:picChg chg="add mod">
-          <ac:chgData name="Basnet Suman" userId="5fcd8753-7e29-47a8-b6ee-19d08df533d1" providerId="ADAL" clId="{137866AE-ED74-4722-9C71-62FBFCDE4828}" dt="2022-04-04T14:37:02.934" v="48" actId="14100"/>
-          <ac:picMkLst>
-            <pc:docMk/>
-            <pc:sldMk cId="601310387" sldId="316"/>
-            <ac:picMk id="5" creationId="{AA17B9F7-9684-4489-83D8-F747F27AEBF0}"/>
-          </ac:picMkLst>
-        </pc:picChg>
-      </pc:sldChg>
-      <pc:sldChg chg="addSp modSp mod">
-        <pc:chgData name="Basnet Suman" userId="5fcd8753-7e29-47a8-b6ee-19d08df533d1" providerId="ADAL" clId="{137866AE-ED74-4722-9C71-62FBFCDE4828}" dt="2022-04-04T14:14:11.994" v="5" actId="14100"/>
-        <pc:sldMkLst>
-          <pc:docMk/>
-          <pc:sldMk cId="155834458" sldId="320"/>
-        </pc:sldMkLst>
-        <pc:picChg chg="add mod">
-          <ac:chgData name="Basnet Suman" userId="5fcd8753-7e29-47a8-b6ee-19d08df533d1" providerId="ADAL" clId="{137866AE-ED74-4722-9C71-62FBFCDE4828}" dt="2022-04-04T14:14:11.994" v="5" actId="14100"/>
-          <ac:picMkLst>
-            <pc:docMk/>
-            <pc:sldMk cId="155834458" sldId="320"/>
-            <ac:picMk id="6" creationId="{FF51A94E-E4C4-431A-81E6-CBD9442723CB}"/>
-          </ac:picMkLst>
-        </pc:picChg>
-      </pc:sldChg>
-      <pc:sldChg chg="addSp delSp modSp mod">
-        <pc:chgData name="Basnet Suman" userId="5fcd8753-7e29-47a8-b6ee-19d08df533d1" providerId="ADAL" clId="{137866AE-ED74-4722-9C71-62FBFCDE4828}" dt="2022-04-04T14:31:05.403" v="22" actId="1076"/>
-        <pc:sldMkLst>
-          <pc:docMk/>
-          <pc:sldMk cId="503814389" sldId="321"/>
-        </pc:sldMkLst>
-        <pc:picChg chg="add del mod">
-          <ac:chgData name="Basnet Suman" userId="5fcd8753-7e29-47a8-b6ee-19d08df533d1" providerId="ADAL" clId="{137866AE-ED74-4722-9C71-62FBFCDE4828}" dt="2022-04-04T14:30:58.886" v="20" actId="478"/>
-          <ac:picMkLst>
-            <pc:docMk/>
-            <pc:sldMk cId="503814389" sldId="321"/>
-            <ac:picMk id="6" creationId="{0F5E3611-3311-47BD-B6A4-B0BBF19AC9AB}"/>
-          </ac:picMkLst>
-        </pc:picChg>
-        <pc:picChg chg="add mod">
-          <ac:chgData name="Basnet Suman" userId="5fcd8753-7e29-47a8-b6ee-19d08df533d1" providerId="ADAL" clId="{137866AE-ED74-4722-9C71-62FBFCDE4828}" dt="2022-04-04T14:31:05.403" v="22" actId="1076"/>
-          <ac:picMkLst>
-            <pc:docMk/>
-            <pc:sldMk cId="503814389" sldId="321"/>
-            <ac:picMk id="8" creationId="{64DB8914-A697-4444-9BA7-2FACE1B79FDC}"/>
-          </ac:picMkLst>
-        </pc:picChg>
-      </pc:sldChg>
-      <pc:sldChg chg="addSp delSp modSp mod">
-        <pc:chgData name="Basnet Suman" userId="5fcd8753-7e29-47a8-b6ee-19d08df533d1" providerId="ADAL" clId="{137866AE-ED74-4722-9C71-62FBFCDE4828}" dt="2022-04-04T14:34:34.610" v="24" actId="1076"/>
-        <pc:sldMkLst>
-          <pc:docMk/>
-          <pc:sldMk cId="1125811932" sldId="322"/>
-        </pc:sldMkLst>
-        <pc:picChg chg="add del mod">
-          <ac:chgData name="Basnet Suman" userId="5fcd8753-7e29-47a8-b6ee-19d08df533d1" providerId="ADAL" clId="{137866AE-ED74-4722-9C71-62FBFCDE4828}" dt="2022-04-04T14:30:50.648" v="19" actId="22"/>
-          <ac:picMkLst>
-            <pc:docMk/>
-            <pc:sldMk cId="1125811932" sldId="322"/>
-            <ac:picMk id="6" creationId="{BFD95C37-9E5A-4D0C-BF0E-E9EE17C19828}"/>
-          </ac:picMkLst>
-        </pc:picChg>
-        <pc:picChg chg="add mod">
-          <ac:chgData name="Basnet Suman" userId="5fcd8753-7e29-47a8-b6ee-19d08df533d1" providerId="ADAL" clId="{137866AE-ED74-4722-9C71-62FBFCDE4828}" dt="2022-04-04T14:34:34.610" v="24" actId="1076"/>
-          <ac:picMkLst>
-            <pc:docMk/>
-            <pc:sldMk cId="1125811932" sldId="322"/>
-            <ac:picMk id="8" creationId="{CCD9848D-0ACA-4A96-9D62-62EF15FD5207}"/>
-          </ac:picMkLst>
-        </pc:picChg>
-      </pc:sldChg>
-      <pc:sldChg chg="addSp delSp modSp new del mod">
-        <pc:chgData name="Basnet Suman" userId="5fcd8753-7e29-47a8-b6ee-19d08df533d1" providerId="ADAL" clId="{137866AE-ED74-4722-9C71-62FBFCDE4828}" dt="2022-04-04T14:36:09.429" v="37" actId="47"/>
-        <pc:sldMkLst>
-          <pc:docMk/>
-          <pc:sldMk cId="921830061" sldId="324"/>
-        </pc:sldMkLst>
-        <pc:spChg chg="mod">
-          <ac:chgData name="Basnet Suman" userId="5fcd8753-7e29-47a8-b6ee-19d08df533d1" providerId="ADAL" clId="{137866AE-ED74-4722-9C71-62FBFCDE4828}" dt="2022-04-04T14:35:12.175" v="32" actId="20577"/>
-          <ac:spMkLst>
-            <pc:docMk/>
-            <pc:sldMk cId="921830061" sldId="324"/>
-            <ac:spMk id="2" creationId="{767B13FF-E497-416C-B5B2-258521DE591F}"/>
-          </ac:spMkLst>
-        </pc:spChg>
-        <pc:spChg chg="del">
-          <ac:chgData name="Basnet Suman" userId="5fcd8753-7e29-47a8-b6ee-19d08df533d1" providerId="ADAL" clId="{137866AE-ED74-4722-9C71-62FBFCDE4828}" dt="2022-04-04T14:35:44.847" v="33" actId="22"/>
-          <ac:spMkLst>
-            <pc:docMk/>
-            <pc:sldMk cId="921830061" sldId="324"/>
-            <ac:spMk id="3" creationId="{BB9E043F-862A-482F-9768-FF650209C6DC}"/>
-          </ac:spMkLst>
-        </pc:spChg>
-        <pc:spChg chg="add mod">
-          <ac:chgData name="Basnet Suman" userId="5fcd8753-7e29-47a8-b6ee-19d08df533d1" providerId="ADAL" clId="{137866AE-ED74-4722-9C71-62FBFCDE4828}" dt="2022-04-04T14:36:07.741" v="36" actId="21"/>
-          <ac:spMkLst>
-            <pc:docMk/>
-            <pc:sldMk cId="921830061" sldId="324"/>
-            <ac:spMk id="8" creationId="{F87C48CA-1FB9-4101-A3E0-B544E3ED990A}"/>
-          </ac:spMkLst>
-        </pc:spChg>
-        <pc:picChg chg="add del mod ord">
-          <ac:chgData name="Basnet Suman" userId="5fcd8753-7e29-47a8-b6ee-19d08df533d1" providerId="ADAL" clId="{137866AE-ED74-4722-9C71-62FBFCDE4828}" dt="2022-04-04T14:36:07.741" v="36" actId="21"/>
-          <ac:picMkLst>
-            <pc:docMk/>
-            <pc:sldMk cId="921830061" sldId="324"/>
-            <ac:picMk id="6" creationId="{44B18E16-C76B-43FF-93B4-02740CD061AA}"/>
-          </ac:picMkLst>
-        </pc:picChg>
-      </pc:sldChg>
-    </pc:docChg>
-  </pc:docChgLst>
-</pc:chgInfo>
-</file>
-
 <file path=ppt/handoutMasters/handoutMaster1.xml><?xml version="1.0" encoding="utf-8"?>
 <p:handoutMaster xmlns:a="http://schemas.openxmlformats.org/drawingml/2006/main" xmlns:r="http://schemas.openxmlformats.org/officeDocument/2006/relationships" xmlns:p="http://schemas.openxmlformats.org/presentationml/2006/main">
   <p:cSld>
@@ -400,7 +234,7 @@
           <a:p>
             <a:fld id="{51BE7678-06AD-400A-897A-A7621F129EE9}" type="datetimeFigureOut">
               <a:rPr lang="en-US" smtClean="0"/>
-              <a:t>4/4/2022</a:t>
+              <a:t>4/5/2022</a:t>
             </a:fld>
             <a:endParaRPr lang="en-US"/>
           </a:p>
@@ -565,7 +399,7 @@
           <a:p>
             <a:fld id="{A6EF5AE3-F23C-4A26-A920-797EF6CC649E}" type="datetimeFigureOut">
               <a:rPr lang="en-US" smtClean="0"/>
-              <a:t>4/4/2022</a:t>
+              <a:t>4/5/2022</a:t>
             </a:fld>
             <a:endParaRPr lang="en-US"/>
           </a:p>
@@ -937,7 +771,7 @@
           <a:p>
             <a:fld id="{301ADAFF-9CED-4701-B77A-786261547FCE}" type="datetime1">
               <a:rPr lang="en-US" smtClean="0"/>
-              <a:t>4/4/2022</a:t>
+              <a:t>4/5/2022</a:t>
             </a:fld>
             <a:endParaRPr lang="en-US"/>
           </a:p>
@@ -1472,7 +1306,7 @@
           <a:p>
             <a:fld id="{6364EDB9-F490-4266-860E-C2714952C2CC}" type="datetime1">
               <a:rPr lang="en-US" smtClean="0"/>
-              <a:t>4/4/2022</a:t>
+              <a:t>4/5/2022</a:t>
             </a:fld>
             <a:endParaRPr lang="en-US"/>
           </a:p>
@@ -1819,7 +1653,7 @@
           <a:p>
             <a:fld id="{B99B8D06-A4A1-4B79-90FE-6BD284269B59}" type="datetime1">
               <a:rPr lang="en-US" smtClean="0"/>
-              <a:t>4/4/2022</a:t>
+              <a:t>4/5/2022</a:t>
             </a:fld>
             <a:endParaRPr lang="en-US"/>
           </a:p>
@@ -2166,7 +2000,7 @@
           <a:p>
             <a:fld id="{4DC6B894-016C-441C-9761-6419E12BC0E6}" type="datetime1">
               <a:rPr lang="en-US" smtClean="0"/>
-              <a:t>4/4/2022</a:t>
+              <a:t>4/5/2022</a:t>
             </a:fld>
             <a:endParaRPr lang="en-US"/>
           </a:p>
@@ -2561,7 +2395,7 @@
           <a:p>
             <a:fld id="{A9CABD54-32B7-419E-8B15-C57EADED1D31}" type="datetime1">
               <a:rPr lang="en-US" smtClean="0"/>
-              <a:t>4/4/2022</a:t>
+              <a:t>4/5/2022</a:t>
             </a:fld>
             <a:endParaRPr lang="en-US"/>
           </a:p>
@@ -3417,7 +3251,7 @@
           <a:p>
             <a:fld id="{5E606000-44DC-413E-A711-034F611E3558}" type="datetime1">
               <a:rPr lang="en-US" smtClean="0"/>
-              <a:t>4/4/2022</a:t>
+              <a:t>4/5/2022</a:t>
             </a:fld>
             <a:endParaRPr lang="en-US"/>
           </a:p>
@@ -3950,7 +3784,7 @@
           <a:p>
             <a:fld id="{F5125D01-0891-48BF-A945-13CAEA25A560}" type="datetime1">
               <a:rPr lang="en-US" smtClean="0"/>
-              <a:t>4/4/2022</a:t>
+              <a:t>4/5/2022</a:t>
             </a:fld>
             <a:endParaRPr lang="en-US"/>
           </a:p>
@@ -4483,7 +4317,7 @@
           <a:p>
             <a:fld id="{40C0B585-EC6E-4410-8120-0F55EC3DE1AF}" type="datetime1">
               <a:rPr lang="en-US" smtClean="0"/>
-              <a:t>4/4/2022</a:t>
+              <a:t>4/5/2022</a:t>
             </a:fld>
             <a:endParaRPr lang="en-US"/>
           </a:p>
@@ -5016,7 +4850,7 @@
           <a:p>
             <a:fld id="{326E3006-8F7C-4087-ABEF-9C78986465DA}" type="datetime1">
               <a:rPr lang="en-US" smtClean="0"/>
-              <a:t>4/4/2022</a:t>
+              <a:t>4/5/2022</a:t>
             </a:fld>
             <a:endParaRPr lang="en-US"/>
           </a:p>
@@ -5623,7 +5457,7 @@
           <a:p>
             <a:fld id="{C7AD062B-0772-43B1-AAE2-787D446A0F37}" type="datetime1">
               <a:rPr lang="en-US" smtClean="0"/>
-              <a:t>4/4/2022</a:t>
+              <a:t>4/5/2022</a:t>
             </a:fld>
             <a:endParaRPr lang="en-US"/>
           </a:p>
@@ -5831,7 +5665,7 @@
           <a:p>
             <a:fld id="{B0120F3A-36F5-43AA-809E-D2AAEE3D1F78}" type="datetime1">
               <a:rPr lang="en-US" smtClean="0"/>
-              <a:t>4/4/2022</a:t>
+              <a:t>4/5/2022</a:t>
             </a:fld>
             <a:endParaRPr lang="en-US"/>
           </a:p>
@@ -6176,7 +6010,7 @@
           <a:p>
             <a:fld id="{E542D70C-98CF-4C65-915D-A7C16DC31520}" type="datetime1">
               <a:rPr lang="en-US" smtClean="0"/>
-              <a:t>4/4/2022</a:t>
+              <a:t>4/5/2022</a:t>
             </a:fld>
             <a:endParaRPr lang="en-US"/>
           </a:p>
@@ -6639,7 +6473,7 @@
           <a:p>
             <a:fld id="{44BE41E5-F7FD-4B9E-9AF4-1713103E94C5}" type="datetime1">
               <a:rPr lang="en-US" smtClean="0"/>
-              <a:t>4/4/2022</a:t>
+              <a:t>4/5/2022</a:t>
             </a:fld>
             <a:endParaRPr lang="en-US"/>
           </a:p>
@@ -6972,7 +6806,7 @@
           <a:p>
             <a:fld id="{D4983392-81C8-4201-9382-1D37F65ED278}" type="datetime1">
               <a:rPr lang="en-US" smtClean="0"/>
-              <a:t>4/4/2022</a:t>
+              <a:t>4/5/2022</a:t>
             </a:fld>
             <a:endParaRPr lang="en-US"/>
           </a:p>
@@ -7494,7 +7328,7 @@
           <a:p>
             <a:fld id="{50D05014-4025-4A6E-8ED7-67EFA624A7AA}" type="datetime1">
               <a:rPr lang="en-US" smtClean="0"/>
-              <a:t>4/4/2022</a:t>
+              <a:t>4/5/2022</a:t>
             </a:fld>
             <a:endParaRPr lang="en-US"/>
           </a:p>
@@ -8010,7 +7844,7 @@
           <a:p>
             <a:fld id="{40E50825-434F-4A31-AF1A-E5957FEFB6F0}" type="datetime1">
               <a:rPr lang="en-US" smtClean="0"/>
-              <a:t>4/4/2022</a:t>
+              <a:t>4/5/2022</a:t>
             </a:fld>
             <a:endParaRPr lang="en-US"/>
           </a:p>
@@ -8463,7 +8297,7 @@
           <a:p>
             <a:fld id="{A9E1E27B-5A96-49AE-9A41-17DD4DF9B0DE}" type="datetime1">
               <a:rPr lang="en-US" smtClean="0"/>
-              <a:t>4/4/2022</a:t>
+              <a:t>4/5/2022</a:t>
             </a:fld>
             <a:endParaRPr lang="en-US"/>
           </a:p>
@@ -8781,7 +8615,7 @@
           <a:p>
             <a:fld id="{E1F56495-6EBA-48E5-AEEB-3B41CE638D72}" type="datetime1">
               <a:rPr lang="en-US" smtClean="0"/>
-              <a:t>4/4/2022</a:t>
+              <a:t>4/5/2022</a:t>
             </a:fld>
             <a:endParaRPr lang="en-US"/>
           </a:p>
@@ -9215,7 +9049,7 @@
           <a:p>
             <a:fld id="{78E3FB76-2FA2-4CCE-B450-2E0EADA3447B}" type="datetime1">
               <a:rPr lang="en-US" smtClean="0"/>
-              <a:t>4/4/2022</a:t>
+              <a:t>4/5/2022</a:t>
             </a:fld>
             <a:endParaRPr lang="en-US" dirty="0"/>
           </a:p>
@@ -9936,6 +9770,355 @@
       </p:grpSpPr>
       <p:sp>
         <p:nvSpPr>
+          <p:cNvPr id="2" name="Title 1">
+            <a:extLst>
+              <a:ext uri="{FF2B5EF4-FFF2-40B4-BE49-F238E27FC236}">
+                <a16:creationId xmlns:a16="http://schemas.microsoft.com/office/drawing/2014/main" id="{C3CCD2AE-E33D-4F8B-BF1E-88471AF42556}"/>
+              </a:ext>
+            </a:extLst>
+          </p:cNvPr>
+          <p:cNvSpPr>
+            <a:spLocks noGrp="1"/>
+          </p:cNvSpPr>
+          <p:nvPr>
+            <p:ph type="title"/>
+          </p:nvPr>
+        </p:nvSpPr>
+        <p:spPr/>
+        <p:txBody>
+          <a:bodyPr/>
+          <a:lstStyle/>
+          <a:p>
+            <a:r>
+              <a:rPr lang="en-US" dirty="0"/>
+              <a:t>Test Automation</a:t>
+            </a:r>
+          </a:p>
+        </p:txBody>
+      </p:sp>
+      <p:sp>
+        <p:nvSpPr>
+          <p:cNvPr id="3" name="Content Placeholder 2">
+            <a:extLst>
+              <a:ext uri="{FF2B5EF4-FFF2-40B4-BE49-F238E27FC236}">
+                <a16:creationId xmlns:a16="http://schemas.microsoft.com/office/drawing/2014/main" id="{5412AB8C-610D-46DF-803C-4A65301BDBCE}"/>
+              </a:ext>
+            </a:extLst>
+          </p:cNvPr>
+          <p:cNvSpPr>
+            <a:spLocks noGrp="1"/>
+          </p:cNvSpPr>
+          <p:nvPr>
+            <p:ph idx="1"/>
+          </p:nvPr>
+        </p:nvSpPr>
+        <p:spPr/>
+        <p:txBody>
+          <a:bodyPr/>
+          <a:lstStyle/>
+          <a:p>
+            <a:r>
+              <a:rPr lang="en-US" dirty="0"/>
+              <a:t>Automation tools:: Robot Framework, </a:t>
+            </a:r>
+            <a:r>
+              <a:rPr lang="en-US" dirty="0" err="1"/>
+              <a:t>Jmeter</a:t>
+            </a:r>
+            <a:r>
+              <a:rPr lang="en-US" dirty="0"/>
+              <a:t>,</a:t>
+            </a:r>
+            <a:r>
+              <a:rPr lang="en-US" sz="2000" b="0" dirty="0">
+                <a:solidFill>
+                  <a:schemeClr val="tx1"/>
+                </a:solidFill>
+              </a:rPr>
+              <a:t> </a:t>
+            </a:r>
+            <a:r>
+              <a:rPr lang="en-US" sz="2000" b="0" dirty="0" err="1">
+                <a:solidFill>
+                  <a:schemeClr val="tx1"/>
+                </a:solidFill>
+              </a:rPr>
+              <a:t>PostMan</a:t>
+            </a:r>
+            <a:r>
+              <a:rPr lang="en-US" sz="2000" b="0" dirty="0">
+                <a:solidFill>
+                  <a:schemeClr val="tx1"/>
+                </a:solidFill>
+              </a:rPr>
+              <a:t>, BURB</a:t>
+            </a:r>
+            <a:endParaRPr lang="en-US" dirty="0"/>
+          </a:p>
+          <a:p>
+            <a:endParaRPr lang="en-US" dirty="0"/>
+          </a:p>
+          <a:p>
+            <a:r>
+              <a:rPr lang="en-US" dirty="0"/>
+              <a:t>TEST bugs handled by JIRA</a:t>
+            </a:r>
+          </a:p>
+          <a:p>
+            <a:endParaRPr lang="en-US" dirty="0"/>
+          </a:p>
+          <a:p>
+            <a:endParaRPr lang="en-US" dirty="0"/>
+          </a:p>
+          <a:p>
+            <a:endParaRPr lang="en-US" dirty="0"/>
+          </a:p>
+          <a:p>
+            <a:endParaRPr lang="en-US" dirty="0"/>
+          </a:p>
+          <a:p>
+            <a:endParaRPr lang="en-US" dirty="0"/>
+          </a:p>
+        </p:txBody>
+      </p:sp>
+      <p:sp>
+        <p:nvSpPr>
+          <p:cNvPr id="4" name="Slide Number Placeholder 3">
+            <a:extLst>
+              <a:ext uri="{FF2B5EF4-FFF2-40B4-BE49-F238E27FC236}">
+                <a16:creationId xmlns:a16="http://schemas.microsoft.com/office/drawing/2014/main" id="{F6B4DDCD-A6BA-4E68-8B90-522070C5C642}"/>
+              </a:ext>
+            </a:extLst>
+          </p:cNvPr>
+          <p:cNvSpPr>
+            <a:spLocks noGrp="1"/>
+          </p:cNvSpPr>
+          <p:nvPr>
+            <p:ph type="sldNum" sz="quarter" idx="12"/>
+          </p:nvPr>
+        </p:nvSpPr>
+        <p:spPr/>
+        <p:txBody>
+          <a:bodyPr/>
+          <a:lstStyle/>
+          <a:p>
+            <a:fld id="{FAFA399C-3ADC-48EA-A9AB-1C1A760B7718}" type="slidenum">
+              <a:rPr lang="en-US" smtClean="0"/>
+              <a:t>10</a:t>
+            </a:fld>
+            <a:endParaRPr lang="en-US"/>
+          </a:p>
+        </p:txBody>
+      </p:sp>
+      <p:graphicFrame>
+        <p:nvGraphicFramePr>
+          <p:cNvPr id="7" name="Object 6">
+            <a:extLst>
+              <a:ext uri="{FF2B5EF4-FFF2-40B4-BE49-F238E27FC236}">
+                <a16:creationId xmlns:a16="http://schemas.microsoft.com/office/drawing/2014/main" id="{918105C9-721C-465D-AA93-1AD4FF361E97}"/>
+              </a:ext>
+            </a:extLst>
+          </p:cNvPr>
+          <p:cNvGraphicFramePr>
+            <a:graphicFrameLocks noChangeAspect="1"/>
+          </p:cNvGraphicFramePr>
+          <p:nvPr>
+            <p:extLst>
+              <p:ext uri="{D42A27DB-BD31-4B8C-83A1-F6EECF244321}">
+                <p14:modId xmlns:p14="http://schemas.microsoft.com/office/powerpoint/2010/main" val="869903293"/>
+              </p:ext>
+            </p:extLst>
+          </p:nvPr>
+        </p:nvGraphicFramePr>
+        <p:xfrm>
+          <a:off x="1859418" y="3188317"/>
+          <a:ext cx="1158990" cy="1560566"/>
+        </p:xfrm>
+        <a:graphic>
+          <a:graphicData uri="http://schemas.openxmlformats.org/presentationml/2006/ole">
+            <mc:AlternateContent xmlns:mc="http://schemas.openxmlformats.org/markup-compatibility/2006">
+              <mc:Choice xmlns:v="urn:schemas-microsoft-com:vml" Requires="v">
+                <p:oleObj spid="_x0000_s2054" name="Document" r:id="rId3" imgW="6084422" imgH="8204987" progId="Word.Document.8">
+                  <p:embed/>
+                </p:oleObj>
+              </mc:Choice>
+              <mc:Fallback>
+                <p:oleObj name="Document" r:id="rId3" imgW="6084422" imgH="8204987" progId="Word.Document.8">
+                  <p:embed/>
+                  <p:pic>
+                    <p:nvPicPr>
+                      <p:cNvPr id="0" name=""/>
+                      <p:cNvPicPr/>
+                      <p:nvPr/>
+                    </p:nvPicPr>
+                    <p:blipFill>
+                      <a:blip r:embed="rId4"/>
+                      <a:stretch>
+                        <a:fillRect/>
+                      </a:stretch>
+                    </p:blipFill>
+                    <p:spPr>
+                      <a:xfrm>
+                        <a:off x="1859418" y="3188317"/>
+                        <a:ext cx="1158990" cy="1560566"/>
+                      </a:xfrm>
+                      <a:prstGeom prst="rect">
+                        <a:avLst/>
+                      </a:prstGeom>
+                    </p:spPr>
+                  </p:pic>
+                </p:oleObj>
+              </mc:Fallback>
+            </mc:AlternateContent>
+          </a:graphicData>
+        </a:graphic>
+      </p:graphicFrame>
+    </p:spTree>
+    <p:extLst>
+      <p:ext uri="{BB962C8B-B14F-4D97-AF65-F5344CB8AC3E}">
+        <p14:creationId xmlns:p14="http://schemas.microsoft.com/office/powerpoint/2010/main" val="1579691658"/>
+      </p:ext>
+    </p:extLst>
+  </p:cSld>
+  <p:clrMapOvr>
+    <a:masterClrMapping/>
+  </p:clrMapOvr>
+</p:sld>
+</file>
+
+<file path=ppt/slides/slide11.xml><?xml version="1.0" encoding="utf-8"?>
+<p:sld xmlns:a="http://schemas.openxmlformats.org/drawingml/2006/main" xmlns:r="http://schemas.openxmlformats.org/officeDocument/2006/relationships" xmlns:p="http://schemas.openxmlformats.org/presentationml/2006/main">
+  <p:cSld>
+    <p:spTree>
+      <p:nvGrpSpPr>
+        <p:cNvPr id="1" name=""/>
+        <p:cNvGrpSpPr/>
+        <p:nvPr/>
+      </p:nvGrpSpPr>
+      <p:grpSpPr>
+        <a:xfrm>
+          <a:off x="0" y="0"/>
+          <a:ext cx="0" cy="0"/>
+          <a:chOff x="0" y="0"/>
+          <a:chExt cx="0" cy="0"/>
+        </a:xfrm>
+      </p:grpSpPr>
+      <p:sp>
+        <p:nvSpPr>
+          <p:cNvPr id="2" name="Title 1">
+            <a:extLst>
+              <a:ext uri="{FF2B5EF4-FFF2-40B4-BE49-F238E27FC236}">
+                <a16:creationId xmlns:a16="http://schemas.microsoft.com/office/drawing/2014/main" id="{D2B46C44-84AF-471B-A937-45084EB11D84}"/>
+              </a:ext>
+            </a:extLst>
+          </p:cNvPr>
+          <p:cNvSpPr>
+            <a:spLocks noGrp="1"/>
+          </p:cNvSpPr>
+          <p:nvPr>
+            <p:ph type="title"/>
+          </p:nvPr>
+        </p:nvSpPr>
+        <p:spPr>
+          <a:xfrm>
+            <a:off x="766764" y="389218"/>
+            <a:ext cx="10656886" cy="5392746"/>
+          </a:xfrm>
+        </p:spPr>
+        <p:txBody>
+          <a:bodyPr/>
+          <a:lstStyle/>
+          <a:p>
+            <a:br>
+              <a:rPr lang="en-US" dirty="0"/>
+            </a:br>
+            <a:br>
+              <a:rPr lang="en-US" dirty="0"/>
+            </a:br>
+            <a:br>
+              <a:rPr lang="en-US" dirty="0"/>
+            </a:br>
+            <a:br>
+              <a:rPr lang="en-US" dirty="0"/>
+            </a:br>
+            <a:r>
+              <a:rPr lang="en-US" dirty="0"/>
+              <a:t>                         THANK YOU!</a:t>
+            </a:r>
+            <a:br>
+              <a:rPr lang="en-US" dirty="0"/>
+            </a:br>
+            <a:br>
+              <a:rPr lang="en-US" dirty="0"/>
+            </a:br>
+            <a:r>
+              <a:rPr lang="en-US" dirty="0"/>
+              <a:t>                              Q &amp; A ????</a:t>
+            </a:r>
+          </a:p>
+        </p:txBody>
+      </p:sp>
+      <p:sp>
+        <p:nvSpPr>
+          <p:cNvPr id="3" name="Slide Number Placeholder 2">
+            <a:extLst>
+              <a:ext uri="{FF2B5EF4-FFF2-40B4-BE49-F238E27FC236}">
+                <a16:creationId xmlns:a16="http://schemas.microsoft.com/office/drawing/2014/main" id="{C10D8CB9-FBF3-43F5-A144-054358F258A1}"/>
+              </a:ext>
+            </a:extLst>
+          </p:cNvPr>
+          <p:cNvSpPr>
+            <a:spLocks noGrp="1"/>
+          </p:cNvSpPr>
+          <p:nvPr>
+            <p:ph type="sldNum" sz="quarter" idx="12"/>
+          </p:nvPr>
+        </p:nvSpPr>
+        <p:spPr/>
+        <p:txBody>
+          <a:bodyPr/>
+          <a:lstStyle/>
+          <a:p>
+            <a:fld id="{FAFA399C-3ADC-48EA-A9AB-1C1A760B7718}" type="slidenum">
+              <a:rPr lang="en-US" smtClean="0"/>
+              <a:t>11</a:t>
+            </a:fld>
+            <a:endParaRPr lang="en-US"/>
+          </a:p>
+        </p:txBody>
+      </p:sp>
+    </p:spTree>
+    <p:extLst>
+      <p:ext uri="{BB962C8B-B14F-4D97-AF65-F5344CB8AC3E}">
+        <p14:creationId xmlns:p14="http://schemas.microsoft.com/office/powerpoint/2010/main" val="1493082478"/>
+      </p:ext>
+    </p:extLst>
+  </p:cSld>
+  <p:clrMapOvr>
+    <a:masterClrMapping/>
+  </p:clrMapOvr>
+</p:sld>
+</file>
+
+<file path=ppt/slides/slide12.xml><?xml version="1.0" encoding="utf-8"?>
+<p:sld xmlns:a="http://schemas.openxmlformats.org/drawingml/2006/main" xmlns:r="http://schemas.openxmlformats.org/officeDocument/2006/relationships" xmlns:p="http://schemas.openxmlformats.org/presentationml/2006/main">
+  <p:cSld>
+    <p:spTree>
+      <p:nvGrpSpPr>
+        <p:cNvPr id="1" name=""/>
+        <p:cNvGrpSpPr/>
+        <p:nvPr/>
+      </p:nvGrpSpPr>
+      <p:grpSpPr>
+        <a:xfrm>
+          <a:off x="0" y="0"/>
+          <a:ext cx="0" cy="0"/>
+          <a:chOff x="0" y="0"/>
+          <a:chExt cx="0" cy="0"/>
+        </a:xfrm>
+      </p:grpSpPr>
+      <p:sp>
+        <p:nvSpPr>
           <p:cNvPr id="4" name="Slide Number Placeholder 3">
             <a:extLst>
               <a:ext uri="{FF2B5EF4-FFF2-40B4-BE49-F238E27FC236}">
@@ -9958,7 +10141,7 @@
             <a:fld id="{FAFA399C-3ADC-48EA-A9AB-1C1A760B7718}" type="slidenum">
               <a:rPr lang="en-US" smtClean="0"/>
               <a:pPr/>
-              <a:t>10</a:t>
+              <a:t>12</a:t>
             </a:fld>
             <a:endParaRPr lang="en-US"/>
           </a:p>
@@ -10043,7 +10226,10 @@
           <a:bodyPr/>
           <a:lstStyle/>
           <a:p>
-            <a:endParaRPr lang="en-US" dirty="0"/>
+            <a:r>
+              <a:rPr lang="en-US" dirty="0"/>
+              <a:t>Requirement</a:t>
+            </a:r>
           </a:p>
         </p:txBody>
       </p:sp>
@@ -10169,7 +10355,7 @@
           <a:p>
             <a:r>
               <a:rPr lang="en-US" dirty="0"/>
-              <a:t>Test Modules :: </a:t>
+              <a:t>Test Modules  </a:t>
             </a:r>
           </a:p>
           <a:p>
@@ -10179,19 +10365,48 @@
                   <a:srgbClr val="FF0000"/>
                 </a:solidFill>
               </a:rPr>
-              <a:t>MODULE 1 :: IoT ---------- Cloud </a:t>
+              <a:t>MODULE 1 :: </a:t>
+            </a:r>
+            <a:r>
+              <a:rPr lang="en-US" dirty="0" err="1">
+                <a:solidFill>
+                  <a:srgbClr val="FF0000"/>
+                </a:solidFill>
+              </a:rPr>
+              <a:t>SmartSensor</a:t>
+            </a:r>
+            <a:r>
+              <a:rPr lang="en-US" dirty="0">
+                <a:solidFill>
+                  <a:srgbClr val="FF0000"/>
+                </a:solidFill>
+              </a:rPr>
+              <a:t> ---------- Cloud </a:t>
             </a:r>
           </a:p>
           <a:p>
             <a:r>
               <a:rPr lang="en-US" dirty="0"/>
-              <a:t>     SUB-MODULE 1 :: IoT</a:t>
-            </a:r>
+              <a:t>     SUB-MODULE 1 :: </a:t>
+            </a:r>
+            <a:r>
+              <a:rPr lang="en-US" dirty="0" err="1"/>
+              <a:t>SmartSensor</a:t>
+            </a:r>
+            <a:endParaRPr lang="en-US" dirty="0"/>
           </a:p>
           <a:p>
             <a:r>
               <a:rPr lang="en-US" dirty="0"/>
-              <a:t>     SUB-MODULE 2 :: IoT (SENSOR) to Gateway</a:t>
+              <a:t>     SUB-MODULE 2 :: </a:t>
+            </a:r>
+            <a:r>
+              <a:rPr lang="en-US" dirty="0" err="1"/>
+              <a:t>SmartSensor</a:t>
+            </a:r>
+            <a:r>
+              <a:rPr lang="en-US" dirty="0"/>
+              <a:t> to Gateway</a:t>
             </a:r>
           </a:p>
           <a:p>
@@ -10213,13 +10428,13 @@
           <a:p>
             <a:r>
               <a:rPr lang="en-US" dirty="0"/>
-              <a:t>     SUB-MODULE 4 :: Cloud</a:t>
+              <a:t>     SUB-MODULE 4 :: Cloud to API</a:t>
             </a:r>
           </a:p>
           <a:p>
             <a:r>
               <a:rPr lang="en-US" dirty="0"/>
-              <a:t>     SUB-MODULE 5 :: API</a:t>
+              <a:t>     SUB-MODULE 5 :: API to End User</a:t>
             </a:r>
           </a:p>
           <a:p>
@@ -10281,8 +10496,8 @@
         </p:blipFill>
         <p:spPr>
           <a:xfrm>
-            <a:off x="5606950" y="745724"/>
-            <a:ext cx="5748098" cy="2570872"/>
+            <a:off x="6604986" y="858128"/>
+            <a:ext cx="5480158" cy="2570872"/>
           </a:xfrm>
           <a:prstGeom prst="rect">
             <a:avLst/>
@@ -10346,7 +10561,23 @@
                   <a:srgbClr val="FF0000"/>
                 </a:solidFill>
               </a:rPr>
-              <a:t>MODULE 1 :: IoT ---------- Cloud </a:t>
+              <a:t>MODULE 1 :: </a:t>
+            </a:r>
+            <a:r>
+              <a:rPr lang="en-US" dirty="0" err="1">
+                <a:solidFill>
+                  <a:srgbClr val="FF0000"/>
+                </a:solidFill>
+              </a:rPr>
+              <a:t>SmartSensor</a:t>
+            </a:r>
+            <a:r>
+              <a:rPr lang="en-US" dirty="0">
+                <a:solidFill>
+                  <a:srgbClr val="FF0000"/>
+                </a:solidFill>
+              </a:rPr>
+              <a:t> ---------- Cloud </a:t>
             </a:r>
             <a:br>
               <a:rPr lang="en-US" dirty="0">
@@ -10357,7 +10588,11 @@
             </a:br>
             <a:r>
               <a:rPr lang="en-US" dirty="0"/>
-              <a:t> SUB-MODULE 1 :: IoT</a:t>
+              <a:t> SUB-MODULE 1 :: </a:t>
+            </a:r>
+            <a:r>
+              <a:rPr lang="en-US" dirty="0" err="1"/>
+              <a:t>SmartSensor</a:t>
             </a:r>
             <a:br>
               <a:rPr lang="en-US" dirty="0"/>
@@ -10392,13 +10627,15 @@
             <p:ph idx="1"/>
           </p:nvPr>
         </p:nvSpPr>
-        <p:spPr/>
+        <p:spPr>
+          <a:xfrm>
+            <a:off x="766764" y="1610169"/>
+            <a:ext cx="10656886" cy="4648587"/>
+          </a:xfrm>
+        </p:spPr>
         <p:txBody>
           <a:bodyPr/>
           <a:lstStyle/>
-          <a:p>
-            <a:endParaRPr lang="en-US" dirty="0"/>
-          </a:p>
           <a:p>
             <a:endParaRPr lang="en-US" dirty="0"/>
           </a:p>
@@ -10421,12 +10658,6 @@
             <a:pPr marL="0" indent="0">
               <a:buNone/>
             </a:pPr>
-            <a:endParaRPr lang="en-US" dirty="0"/>
-          </a:p>
-          <a:p>
-            <a:pPr marL="0" indent="0">
-              <a:buNone/>
-            </a:pPr>
             <a:r>
               <a:rPr lang="en-US" dirty="0"/>
               <a:t>Test levels</a:t>
@@ -10439,7 +10670,7 @@
             </a:pPr>
             <a:r>
               <a:rPr lang="en-US" dirty="0"/>
-              <a:t>Usability testing (easy for end user/tester)</a:t>
+              <a:t>Usability testing (easy for end user)</a:t>
             </a:r>
           </a:p>
           <a:p>
@@ -10451,6 +10682,50 @@
               <a:rPr lang="en-US" dirty="0"/>
               <a:t>Security testing (To test the data is encrypted)</a:t>
             </a:r>
+          </a:p>
+          <a:p>
+            <a:pPr>
+              <a:buFont typeface="Wingdings" panose="05000000000000000000" pitchFamily="2" charset="2"/>
+              <a:buChar char="Ø"/>
+            </a:pPr>
+            <a:r>
+              <a:rPr lang="en-US" dirty="0"/>
+              <a:t>Functionality (High level)</a:t>
+            </a:r>
+          </a:p>
+          <a:p>
+            <a:pPr marL="0" indent="0">
+              <a:buNone/>
+            </a:pPr>
+            <a:r>
+              <a:rPr lang="en-US" dirty="0"/>
+              <a:t>Tools :: </a:t>
+            </a:r>
+            <a:r>
+              <a:rPr lang="en-US" dirty="0" err="1"/>
+              <a:t>WireShark</a:t>
+            </a:r>
+            <a:r>
+              <a:rPr lang="en-US" dirty="0"/>
+              <a:t>,</a:t>
+            </a:r>
+            <a:r>
+              <a:rPr lang="en-US" sz="2400" b="1" dirty="0">
+                <a:solidFill>
+                  <a:schemeClr val="tx1"/>
+                </a:solidFill>
+              </a:rPr>
+              <a:t> </a:t>
+            </a:r>
+            <a:r>
+              <a:rPr lang="en-US" sz="2400" dirty="0" err="1">
+                <a:solidFill>
+                  <a:schemeClr val="tx1"/>
+                </a:solidFill>
+              </a:rPr>
+              <a:t>Jodan</a:t>
+            </a:r>
+            <a:endParaRPr lang="en-US" dirty="0"/>
           </a:p>
           <a:p>
             <a:pPr>
@@ -10522,7 +10797,7 @@
         </p:blipFill>
         <p:spPr>
           <a:xfrm>
-            <a:off x="597878" y="2124683"/>
+            <a:off x="4273233" y="1378959"/>
             <a:ext cx="6189784" cy="2743741"/>
           </a:xfrm>
           <a:prstGeom prst="rect">
@@ -10588,7 +10863,7 @@
                   <a:srgbClr val="00A5E5"/>
                 </a:solidFill>
               </a:rPr>
-              <a:t>SUB-MODULE 2 :: IoT (SENSOR) to Gateway</a:t>
+              <a:t>SUB-MODULE 2 :: SENSOR to Gateway</a:t>
             </a:r>
             <a:br>
               <a:rPr lang="en-US" dirty="0">
@@ -10663,7 +10938,7 @@
             </a:pPr>
             <a:r>
               <a:rPr lang="en-US" dirty="0"/>
-              <a:t> Performance testing (multiple sensor / 24 x7)</a:t>
+              <a:t>Network testing (connectivity)</a:t>
             </a:r>
           </a:p>
           <a:p>
@@ -10673,7 +10948,7 @@
             </a:pPr>
             <a:r>
               <a:rPr lang="en-US" dirty="0"/>
-              <a:t> Security testing </a:t>
+              <a:t>Security testing (Encrypted data)</a:t>
             </a:r>
           </a:p>
           <a:p>
@@ -10683,7 +10958,7 @@
             </a:pPr>
             <a:r>
               <a:rPr lang="en-US" dirty="0"/>
-              <a:t> Network testing</a:t>
+              <a:t>Performance testing (supports multiple sensor / 24 x7)</a:t>
             </a:r>
           </a:p>
           <a:p>
@@ -10693,7 +10968,7 @@
             </a:pPr>
             <a:r>
               <a:rPr lang="en-US" dirty="0"/>
-              <a:t> Compatibility testing(since s/w &amp; h/w are used in sensor</a:t>
+              <a:t>Compatibility testing (Between sensor and Gateway)</a:t>
             </a:r>
           </a:p>
           <a:p>
@@ -10909,7 +11184,7 @@
             </a:pPr>
             <a:r>
               <a:rPr lang="en-US" sz="2000" dirty="0"/>
-              <a:t>Network testing</a:t>
+              <a:t>Network testing (Connectivity)</a:t>
             </a:r>
           </a:p>
           <a:p>
@@ -10929,7 +11204,7 @@
             </a:pPr>
             <a:r>
               <a:rPr lang="en-US" sz="2000" dirty="0"/>
-              <a:t>Security testing (since its connected to network)</a:t>
+              <a:t>Security testing (MQTT)</a:t>
             </a:r>
           </a:p>
           <a:p>
@@ -10939,7 +11214,7 @@
             </a:pPr>
             <a:r>
               <a:rPr lang="en-US" sz="2000" dirty="0"/>
-              <a:t>Stability testing</a:t>
+              <a:t>Stability testing (Load)</a:t>
             </a:r>
           </a:p>
           <a:p>
@@ -11022,7 +11297,7 @@
         </p:blipFill>
         <p:spPr>
           <a:xfrm>
-            <a:off x="4709652" y="1020095"/>
+            <a:off x="5641808" y="886930"/>
             <a:ext cx="5663380" cy="3207776"/>
           </a:xfrm>
           <a:prstGeom prst="rect">
@@ -11105,7 +11380,7 @@
             </a:br>
             <a:r>
               <a:rPr lang="en-US" sz="3200" dirty="0"/>
-              <a:t>SUB-MODULE 4 :: Cloud / API</a:t>
+              <a:t>SUB-MODULE 4 :: Cloud to API</a:t>
             </a:r>
             <a:endParaRPr lang="en-US" dirty="0"/>
           </a:p>
@@ -11171,11 +11446,11 @@
                   <a:schemeClr val="tx1"/>
                 </a:solidFill>
               </a:rPr>
-              <a:t>Performance testing (</a:t>
+              <a:t>Functionality (Decryption</a:t>
             </a:r>
             <a:r>
               <a:rPr lang="en-US" sz="2000" dirty="0"/>
-              <a:t>L</a:t>
+              <a:t> data, </a:t>
             </a:r>
             <a:r>
               <a:rPr lang="en-US" sz="2000" b="0" dirty="0">
@@ -11183,19 +11458,7 @@
                   <a:schemeClr val="tx1"/>
                 </a:solidFill>
               </a:rPr>
-              <a:t>oad, </a:t>
-            </a:r>
-            <a:r>
-              <a:rPr lang="en-US" sz="2000" dirty="0"/>
-              <a:t>S</a:t>
-            </a:r>
-            <a:r>
-              <a:rPr lang="en-US" sz="2000" b="0" dirty="0">
-                <a:solidFill>
-                  <a:schemeClr val="tx1"/>
-                </a:solidFill>
-              </a:rPr>
-              <a:t>calability, Stress)</a:t>
+              <a:t>Error handling, Parameters tested, Negative testing)</a:t>
             </a:r>
           </a:p>
           <a:p>
@@ -11209,7 +11472,31 @@
                   <a:schemeClr val="tx1"/>
                 </a:solidFill>
               </a:rPr>
-              <a:t>Functionality (Error handling, Parameters tested, Negative testing)</a:t>
+              <a:t>Performance testing (</a:t>
+            </a:r>
+            <a:r>
+              <a:rPr lang="en-US" sz="2000" dirty="0"/>
+              <a:t>L</a:t>
+            </a:r>
+            <a:r>
+              <a:rPr lang="en-US" sz="2000" b="0" dirty="0">
+                <a:solidFill>
+                  <a:schemeClr val="tx1"/>
+                </a:solidFill>
+              </a:rPr>
+              <a:t>oad, </a:t>
+            </a:r>
+            <a:r>
+              <a:rPr lang="en-US" sz="2000" dirty="0"/>
+              <a:t>S</a:t>
+            </a:r>
+            <a:r>
+              <a:rPr lang="en-US" sz="2000" b="0" dirty="0">
+                <a:solidFill>
+                  <a:schemeClr val="tx1"/>
+                </a:solidFill>
+              </a:rPr>
+              <a:t>calability, Stress)</a:t>
             </a:r>
           </a:p>
           <a:p>
@@ -11229,16 +11516,21 @@
                   <a:schemeClr val="tx1"/>
                 </a:solidFill>
               </a:rPr>
-              <a:t>Test tools :: JMeter, Shodan (</a:t>
-            </a:r>
-            <a:r>
-              <a:rPr lang="en-US" sz="2000" dirty="0">
+              <a:t>Test tools :: </a:t>
+            </a:r>
+            <a:r>
+              <a:rPr lang="en-US" sz="2000" dirty="0" err="1">
                 <a:solidFill>
                   <a:schemeClr val="tx1"/>
                 </a:solidFill>
               </a:rPr>
-              <a:t>to check the device connectivity on network)</a:t>
-            </a:r>
+              <a:t>Jmeter</a:t>
+            </a:r>
+            <a:endParaRPr lang="en-US" sz="2000" dirty="0">
+              <a:solidFill>
+                <a:schemeClr val="tx1"/>
+              </a:solidFill>
+            </a:endParaRPr>
           </a:p>
           <a:p>
             <a:pPr marL="0" indent="0">
@@ -11307,8 +11599,8 @@
         </p:blipFill>
         <p:spPr>
           <a:xfrm>
-            <a:off x="5358810" y="1040721"/>
-            <a:ext cx="6267450" cy="2857500"/>
+            <a:off x="6558668" y="1037218"/>
+            <a:ext cx="5631745" cy="2857500"/>
           </a:xfrm>
           <a:prstGeom prst="rect">
             <a:avLst/>
@@ -11391,7 +11683,7 @@
         </p:nvSpPr>
         <p:spPr>
           <a:xfrm>
-            <a:off x="766764" y="1610169"/>
+            <a:off x="523783" y="1037218"/>
             <a:ext cx="10656886" cy="4909809"/>
           </a:xfrm>
         </p:spPr>
@@ -11425,12 +11717,8 @@
               <a:buChar char="Ø"/>
             </a:pPr>
             <a:r>
-              <a:rPr lang="en-US" sz="2400" b="0" dirty="0">
-                <a:solidFill>
-                  <a:schemeClr val="tx1"/>
-                </a:solidFill>
-              </a:rPr>
-              <a:t>Performance testing (load, scalability, Stress) </a:t>
+              <a:rPr lang="en-US" sz="2400" dirty="0"/>
+              <a:t>Functionality (UI, Trigger Alert)</a:t>
             </a:r>
           </a:p>
           <a:p>
@@ -11439,79 +11727,31 @@
               <a:buChar char="Ø"/>
             </a:pPr>
             <a:r>
+              <a:rPr lang="en-US" sz="2400" b="0" dirty="0">
+                <a:solidFill>
+                  <a:schemeClr val="tx1"/>
+                </a:solidFill>
+              </a:rPr>
+              <a:t>Performance testing (load, scalability, Stress) </a:t>
+            </a:r>
+            <a:endParaRPr lang="en-US" sz="2400" dirty="0"/>
+          </a:p>
+          <a:p>
+            <a:pPr>
+              <a:buFont typeface="Wingdings" panose="05000000000000000000" pitchFamily="2" charset="2"/>
+              <a:buChar char="Ø"/>
+            </a:pPr>
+            <a:r>
+              <a:rPr lang="en-US" sz="2400" b="0" dirty="0">
+                <a:solidFill>
+                  <a:schemeClr val="tx1"/>
+                </a:solidFill>
+              </a:rPr>
+              <a:t>Compatibi</a:t>
+            </a:r>
+            <a:r>
               <a:rPr lang="en-US" sz="2400" dirty="0"/>
-              <a:t>Functionality (Usability,</a:t>
-            </a:r>
-            <a:br>
-              <a:rPr lang="en-US" sz="2400" b="0" dirty="0">
-                <a:solidFill>
-                  <a:schemeClr val="tx1"/>
-                </a:solidFill>
-              </a:rPr>
-            </a:br>
-            <a:r>
-              <a:rPr lang="en-US" sz="2400" b="0" dirty="0">
-                <a:solidFill>
-                  <a:schemeClr val="tx1"/>
-                </a:solidFill>
-              </a:rPr>
-              <a:t>               </a:t>
-            </a:r>
-          </a:p>
-          <a:p>
-            <a:r>
-              <a:rPr lang="en-US" sz="2400" b="1" dirty="0">
-                <a:solidFill>
-                  <a:schemeClr val="tx1"/>
-                </a:solidFill>
-              </a:rPr>
-              <a:t>Test tools</a:t>
-            </a:r>
-            <a:r>
-              <a:rPr lang="en-US" sz="2400" b="0" dirty="0">
-                <a:solidFill>
-                  <a:schemeClr val="tx1"/>
-                </a:solidFill>
-              </a:rPr>
-              <a:t>::</a:t>
-            </a:r>
-            <a:r>
-              <a:rPr lang="en-US" sz="2400" b="0" dirty="0" err="1">
-                <a:solidFill>
-                  <a:schemeClr val="tx1"/>
-                </a:solidFill>
-              </a:rPr>
-              <a:t>Jmeter</a:t>
-            </a:r>
-            <a:r>
-              <a:rPr lang="en-US" sz="2400" b="0" dirty="0">
-                <a:solidFill>
-                  <a:schemeClr val="tx1"/>
-                </a:solidFill>
-              </a:rPr>
-              <a:t> for performance testing , </a:t>
-            </a:r>
-            <a:r>
-              <a:rPr lang="en-US" sz="2400" b="0" dirty="0" err="1">
-                <a:solidFill>
-                  <a:schemeClr val="tx1"/>
-                </a:solidFill>
-              </a:rPr>
-              <a:t>PostMan</a:t>
-            </a:r>
-            <a:r>
-              <a:rPr lang="en-US" sz="2400" b="0" dirty="0">
-                <a:solidFill>
-                  <a:schemeClr val="tx1"/>
-                </a:solidFill>
-              </a:rPr>
-              <a:t> for functionality testing, BURP for security testing</a:t>
-            </a:r>
-          </a:p>
-          <a:p>
-            <a:r>
-              <a:rPr lang="en-US" sz="2400" dirty="0"/>
-              <a:t>Automation :: Functionality</a:t>
+              <a:t>lity(Android/iOS),Usability,</a:t>
             </a:r>
             <a:endParaRPr lang="en-US" sz="2400" b="0" dirty="0">
               <a:solidFill>
@@ -11520,6 +11760,67 @@
             </a:endParaRPr>
           </a:p>
           <a:p>
+            <a:r>
+              <a:rPr lang="en-US" sz="2400" b="1" dirty="0">
+                <a:solidFill>
+                  <a:schemeClr val="tx1"/>
+                </a:solidFill>
+              </a:rPr>
+              <a:t>Test tools</a:t>
+            </a:r>
+            <a:r>
+              <a:rPr lang="en-US" sz="2400" b="0" dirty="0">
+                <a:solidFill>
+                  <a:schemeClr val="tx1"/>
+                </a:solidFill>
+              </a:rPr>
+              <a:t>::</a:t>
+            </a:r>
+            <a:r>
+              <a:rPr lang="en-US" sz="2400" b="0" dirty="0" err="1">
+                <a:solidFill>
+                  <a:schemeClr val="tx1"/>
+                </a:solidFill>
+              </a:rPr>
+              <a:t>Jmeter</a:t>
+            </a:r>
+            <a:r>
+              <a:rPr lang="en-US" sz="2400" b="0" dirty="0">
+                <a:solidFill>
+                  <a:schemeClr val="tx1"/>
+                </a:solidFill>
+              </a:rPr>
+              <a:t> for performance testing , </a:t>
+            </a:r>
+            <a:r>
+              <a:rPr lang="en-US" sz="2400" b="0" dirty="0" err="1">
+                <a:solidFill>
+                  <a:schemeClr val="tx1"/>
+                </a:solidFill>
+              </a:rPr>
+              <a:t>PostMan</a:t>
+            </a:r>
+            <a:r>
+              <a:rPr lang="en-US" sz="2400" b="0" dirty="0">
+                <a:solidFill>
+                  <a:schemeClr val="tx1"/>
+                </a:solidFill>
+              </a:rPr>
+              <a:t> for functionality testing, BURP for security testing</a:t>
+            </a:r>
+          </a:p>
+          <a:p>
+            <a:r>
+              <a:rPr lang="en-US" sz="2400" dirty="0"/>
+              <a:t>Automation :: Functionality, Performance (More focus)</a:t>
+            </a:r>
+            <a:endParaRPr lang="en-US" sz="2400" b="0" dirty="0">
+              <a:solidFill>
+                <a:schemeClr val="tx1"/>
+              </a:solidFill>
+            </a:endParaRPr>
+          </a:p>
+          <a:p>
             <a:pPr marL="0" indent="0">
               <a:buNone/>
             </a:pPr>
@@ -11571,32 +11872,49 @@
       </p:sp>
       <p:pic>
         <p:nvPicPr>
-          <p:cNvPr id="8" name="Picture 7">
-            <a:extLst>
-              <a:ext uri="{FF2B5EF4-FFF2-40B4-BE49-F238E27FC236}">
-                <a16:creationId xmlns:a16="http://schemas.microsoft.com/office/drawing/2014/main" id="{CCD9848D-0ACA-4A96-9D62-62EF15FD5207}"/>
+          <p:cNvPr id="1026" name="Picture 2">
+            <a:extLst>
+              <a:ext uri="{FF2B5EF4-FFF2-40B4-BE49-F238E27FC236}">
+                <a16:creationId xmlns:a16="http://schemas.microsoft.com/office/drawing/2014/main" id="{773E56A3-08D8-44AB-8971-2A3CB9BCF791}"/>
               </a:ext>
             </a:extLst>
           </p:cNvPr>
           <p:cNvPicPr>
-            <a:picLocks noChangeAspect="1"/>
+            <a:picLocks noChangeAspect="1" noChangeArrowheads="1"/>
           </p:cNvPicPr>
           <p:nvPr/>
         </p:nvPicPr>
         <p:blipFill>
-          <a:blip r:embed="rId2"/>
+          <a:blip r:embed="rId2">
+            <a:extLst>
+              <a:ext uri="{28A0092B-C50C-407E-A947-70E740481C1C}">
+                <a14:useLocalDpi xmlns:a14="http://schemas.microsoft.com/office/drawing/2010/main" val="0"/>
+              </a:ext>
+            </a:extLst>
+          </a:blip>
+          <a:srcRect/>
           <a:stretch>
             <a:fillRect/>
           </a:stretch>
         </p:blipFill>
-        <p:spPr>
+        <p:spPr bwMode="auto">
           <a:xfrm>
-            <a:off x="4814888" y="856481"/>
-            <a:ext cx="6753225" cy="2962275"/>
+            <a:off x="5038338" y="825122"/>
+            <a:ext cx="5248275" cy="2379717"/>
           </a:xfrm>
           <a:prstGeom prst="rect">
             <a:avLst/>
           </a:prstGeom>
+          <a:noFill/>
+          <a:extLst>
+            <a:ext uri="{909E8E84-426E-40DD-AFC4-6F175D3DCCD1}">
+              <a14:hiddenFill xmlns:a14="http://schemas.microsoft.com/office/drawing/2010/main">
+                <a:solidFill>
+                  <a:srgbClr val="FFFFFF"/>
+                </a:solidFill>
+              </a14:hiddenFill>
+            </a:ext>
+          </a:extLst>
         </p:spPr>
       </p:pic>
     </p:spTree>
@@ -11634,7 +11952,7 @@
           <p:cNvPr id="2" name="Title 1">
             <a:extLst>
               <a:ext uri="{FF2B5EF4-FFF2-40B4-BE49-F238E27FC236}">
-                <a16:creationId xmlns:a16="http://schemas.microsoft.com/office/drawing/2014/main" id="{C3CCD2AE-E33D-4F8B-BF1E-88471AF42556}"/>
+                <a16:creationId xmlns:a16="http://schemas.microsoft.com/office/drawing/2014/main" id="{68C2B86B-EFE3-418A-AFFC-2D98019DF9D6}"/>
               </a:ext>
             </a:extLst>
           </p:cNvPr>
@@ -11651,8 +11969,12 @@
           <a:lstStyle/>
           <a:p>
             <a:r>
+              <a:rPr lang="en-US" dirty="0" err="1"/>
+              <a:t>SmartSensor</a:t>
+            </a:r>
+            <a:r>
               <a:rPr lang="en-US" dirty="0"/>
-              <a:t>Test Automation</a:t>
+              <a:t> to End User (End-to-End testing)</a:t>
             </a:r>
           </a:p>
         </p:txBody>
@@ -11662,7 +11984,7 @@
           <p:cNvPr id="3" name="Content Placeholder 2">
             <a:extLst>
               <a:ext uri="{FF2B5EF4-FFF2-40B4-BE49-F238E27FC236}">
-                <a16:creationId xmlns:a16="http://schemas.microsoft.com/office/drawing/2014/main" id="{5412AB8C-610D-46DF-803C-4A65301BDBCE}"/>
+                <a16:creationId xmlns:a16="http://schemas.microsoft.com/office/drawing/2014/main" id="{8727E973-1BAF-4228-9A9B-690DBF03148E}"/>
               </a:ext>
             </a:extLst>
           </p:cNvPr>
@@ -11680,46 +12002,95 @@
           <a:p>
             <a:r>
               <a:rPr lang="en-US" dirty="0"/>
-              <a:t>Automation tools:: Robot Framework (?), Spirent libraries, </a:t>
-            </a:r>
-            <a:r>
-              <a:rPr lang="en-US" dirty="0" err="1"/>
+              <a:t>TEST levels</a:t>
+            </a:r>
+          </a:p>
+          <a:p>
+            <a:pPr>
+              <a:buFont typeface="Wingdings" panose="05000000000000000000" pitchFamily="2" charset="2"/>
+              <a:buChar char="Ø"/>
+            </a:pPr>
+            <a:r>
+              <a:rPr lang="en-US" sz="2000" b="0" dirty="0">
+                <a:solidFill>
+                  <a:schemeClr val="tx1"/>
+                </a:solidFill>
+              </a:rPr>
+              <a:t>End to End complete system testing (Performance)</a:t>
+            </a:r>
+          </a:p>
+          <a:p>
+            <a:r>
+              <a:rPr lang="en-US" sz="2000" b="1" dirty="0">
+                <a:solidFill>
+                  <a:schemeClr val="tx1"/>
+                </a:solidFill>
+              </a:rPr>
+              <a:t>Test tools</a:t>
+            </a:r>
+            <a:r>
+              <a:rPr lang="en-US" sz="2000" b="0" dirty="0">
+                <a:solidFill>
+                  <a:schemeClr val="tx1"/>
+                </a:solidFill>
+              </a:rPr>
+              <a:t>::</a:t>
+            </a:r>
+            <a:r>
+              <a:rPr lang="en-US" sz="2000" b="0" dirty="0" err="1">
+                <a:solidFill>
+                  <a:schemeClr val="tx1"/>
+                </a:solidFill>
+              </a:rPr>
               <a:t>Jmeter</a:t>
             </a:r>
             <a:r>
-              <a:rPr lang="en-US" dirty="0"/>
-              <a:t>, </a:t>
-            </a:r>
-            <a:r>
-              <a:rPr lang="en-US" dirty="0" err="1"/>
-              <a:t>RESTAssured</a:t>
-            </a:r>
+              <a:rPr lang="en-US" sz="2000" b="0" dirty="0">
+                <a:solidFill>
+                  <a:schemeClr val="tx1"/>
+                </a:solidFill>
+              </a:rPr>
+              <a:t> for performance testing</a:t>
+            </a:r>
+          </a:p>
+          <a:p>
+            <a:r>
+              <a:rPr lang="en-US" sz="2000" dirty="0"/>
+              <a:t>Automation :: Performance</a:t>
+            </a:r>
+          </a:p>
+          <a:p>
+            <a:endParaRPr lang="en-US" sz="2000" b="0" dirty="0">
+              <a:solidFill>
+                <a:schemeClr val="tx1"/>
+              </a:solidFill>
+            </a:endParaRPr>
+          </a:p>
+          <a:p>
+            <a:endParaRPr lang="en-US" sz="2000" dirty="0"/>
+          </a:p>
+          <a:p>
+            <a:r>
+              <a:rPr lang="en-US" sz="2000" b="0" dirty="0">
+                <a:solidFill>
+                  <a:schemeClr val="tx1"/>
+                </a:solidFill>
+              </a:rPr>
+              <a:t>At the end will do a Pilot testing before </a:t>
+            </a:r>
+            <a:r>
+              <a:rPr lang="en-US" sz="2000" dirty="0"/>
+              <a:t>handling it to the Stakeholders!</a:t>
+            </a:r>
+            <a:endParaRPr lang="en-US" sz="2000" b="0" dirty="0">
+              <a:solidFill>
+                <a:schemeClr val="tx1"/>
+              </a:solidFill>
+            </a:endParaRPr>
+          </a:p>
+          <a:p>
             <a:endParaRPr lang="en-US" dirty="0"/>
           </a:p>
-          <a:p>
-            <a:endParaRPr lang="en-US" dirty="0"/>
-          </a:p>
-          <a:p>
-            <a:r>
-              <a:rPr lang="en-US" dirty="0"/>
-              <a:t>TEST bugs handled by JIRA</a:t>
-            </a:r>
-          </a:p>
-          <a:p>
-            <a:endParaRPr lang="en-US" dirty="0"/>
-          </a:p>
-          <a:p>
-            <a:endParaRPr lang="en-US" dirty="0"/>
-          </a:p>
-          <a:p>
-            <a:endParaRPr lang="en-US" dirty="0"/>
-          </a:p>
-          <a:p>
-            <a:endParaRPr lang="en-US" dirty="0"/>
-          </a:p>
-          <a:p>
-            <a:endParaRPr lang="en-US" dirty="0"/>
-          </a:p>
         </p:txBody>
       </p:sp>
       <p:sp>
@@ -11727,7 +12098,7 @@
           <p:cNvPr id="4" name="Slide Number Placeholder 3">
             <a:extLst>
               <a:ext uri="{FF2B5EF4-FFF2-40B4-BE49-F238E27FC236}">
-                <a16:creationId xmlns:a16="http://schemas.microsoft.com/office/drawing/2014/main" id="{F6B4DDCD-A6BA-4E68-8B90-522070C5C642}"/>
+                <a16:creationId xmlns:a16="http://schemas.microsoft.com/office/drawing/2014/main" id="{B3217772-FF24-4FA2-A9A1-9BD3EA423CDC}"/>
               </a:ext>
             </a:extLst>
           </p:cNvPr>
@@ -11754,7 +12125,7 @@
     </p:spTree>
     <p:extLst>
       <p:ext uri="{BB962C8B-B14F-4D97-AF65-F5344CB8AC3E}">
-        <p14:creationId xmlns:p14="http://schemas.microsoft.com/office/powerpoint/2010/main" val="1579691658"/>
+        <p14:creationId xmlns:p14="http://schemas.microsoft.com/office/powerpoint/2010/main" val="4016141508"/>
       </p:ext>
     </p:extLst>
   </p:cSld>
@@ -12514,21 +12885,6 @@
 </file>
 
 <file path=customXml/item1.xml><?xml version="1.0" encoding="utf-8"?>
-<?mso-contentType ?>
-<FormTemplates xmlns="http://schemas.microsoft.com/sharepoint/v3/contenttype/forms">
-  <Display>DocumentLibraryForm</Display>
-  <Edit>DocumentLibraryForm</Edit>
-  <New>DocumentLibraryForm</New>
-</FormTemplates>
-</file>
-
-<file path=customXml/item2.xml><?xml version="1.0" encoding="utf-8"?>
-<p:properties xmlns:p="http://schemas.microsoft.com/office/2006/metadata/properties" xmlns:xsi="http://www.w3.org/2001/XMLSchema-instance" xmlns:pc="http://schemas.microsoft.com/office/infopath/2007/PartnerControls">
-  <documentManagement/>
-</p:properties>
-</file>
-
-<file path=customXml/item3.xml><?xml version="1.0" encoding="utf-8"?>
 <ct:contentTypeSchema xmlns:ct="http://schemas.microsoft.com/office/2006/metadata/contentType" xmlns:ma="http://schemas.microsoft.com/office/2006/metadata/properties/metaAttributes" ct:_="" ma:_="" ma:contentTypeName="Document" ma:contentTypeID="0x01010035EDA6CBE9F2AC4EB4C2BD63BDBF899C" ma:contentTypeVersion="9" ma:contentTypeDescription="Create a new document." ma:contentTypeScope="" ma:versionID="9817d1fb77564fe4332576d279f4448a">
   <xsd:schema xmlns:xsd="http://www.w3.org/2001/XMLSchema" xmlns:xs="http://www.w3.org/2001/XMLSchema" xmlns:p="http://schemas.microsoft.com/office/2006/metadata/properties" xmlns:ns3="20ab0764-78d8-4a2e-b291-590abc6cbfc9" xmlns:ns4="2e6bbb0f-77ab-4622-9451-ccc736b8eff5" targetNamespace="http://schemas.microsoft.com/office/2006/metadata/properties" ma:root="true" ma:fieldsID="154dbd35530105ed191e91109ed91b62" ns3:_="" ns4:_="">
     <xsd:import namespace="20ab0764-78d8-4a2e-b291-590abc6cbfc9"/>
@@ -12725,32 +13081,22 @@
 </ct:contentTypeSchema>
 </file>
 
-<file path=customXml/itemProps1.xml><?xml version="1.0" encoding="utf-8"?>
-<ds:datastoreItem xmlns:ds="http://schemas.openxmlformats.org/officeDocument/2006/customXml" ds:itemID="{BAE466B8-72B2-4A90-80DF-05EB5AFED783}">
-  <ds:schemaRefs>
-    <ds:schemaRef ds:uri="http://schemas.microsoft.com/sharepoint/v3/contenttype/forms"/>
-  </ds:schemaRefs>
-</ds:datastoreItem>
+<file path=customXml/item2.xml><?xml version="1.0" encoding="utf-8"?>
+<?mso-contentType ?>
+<FormTemplates xmlns="http://schemas.microsoft.com/sharepoint/v3/contenttype/forms">
+  <Display>DocumentLibraryForm</Display>
+  <Edit>DocumentLibraryForm</Edit>
+  <New>DocumentLibraryForm</New>
+</FormTemplates>
 </file>
 
-<file path=customXml/itemProps2.xml><?xml version="1.0" encoding="utf-8"?>
-<ds:datastoreItem xmlns:ds="http://schemas.openxmlformats.org/officeDocument/2006/customXml" ds:itemID="{12155729-2BCB-47EF-AA23-D89073AFCE32}">
-  <ds:schemaRefs>
-    <ds:schemaRef ds:uri="http://schemas.microsoft.com/office/infopath/2007/PartnerControls"/>
-    <ds:schemaRef ds:uri="20ab0764-78d8-4a2e-b291-590abc6cbfc9"/>
-    <ds:schemaRef ds:uri="http://www.w3.org/XML/1998/namespace"/>
-    <ds:schemaRef ds:uri="http://purl.org/dc/elements/1.1/"/>
-    <ds:schemaRef ds:uri="2e6bbb0f-77ab-4622-9451-ccc736b8eff5"/>
-    <ds:schemaRef ds:uri="http://purl.org/dc/terms/"/>
-    <ds:schemaRef ds:uri="http://schemas.microsoft.com/office/2006/documentManagement/types"/>
-    <ds:schemaRef ds:uri="http://schemas.openxmlformats.org/package/2006/metadata/core-properties"/>
-    <ds:schemaRef ds:uri="http://purl.org/dc/dcmitype/"/>
-    <ds:schemaRef ds:uri="http://schemas.microsoft.com/office/2006/metadata/properties"/>
-  </ds:schemaRefs>
-</ds:datastoreItem>
+<file path=customXml/item3.xml><?xml version="1.0" encoding="utf-8"?>
+<p:properties xmlns:p="http://schemas.microsoft.com/office/2006/metadata/properties" xmlns:xsi="http://www.w3.org/2001/XMLSchema-instance" xmlns:pc="http://schemas.microsoft.com/office/infopath/2007/PartnerControls">
+  <documentManagement/>
+</p:properties>
 </file>
 
-<file path=customXml/itemProps3.xml><?xml version="1.0" encoding="utf-8"?>
+<file path=customXml/itemProps1.xml><?xml version="1.0" encoding="utf-8"?>
 <ds:datastoreItem xmlns:ds="http://schemas.openxmlformats.org/officeDocument/2006/customXml" ds:itemID="{F4E7B80F-9DB7-4CC2-896A-DA26F18FB96B}">
   <ds:schemaRefs>
     <ds:schemaRef ds:uri="http://schemas.microsoft.com/office/2006/metadata/contentType"/>
@@ -12767,4 +13113,29 @@
     <ds:schemaRef ds:uri="http://schemas.microsoft.com/internal/obd"/>
   </ds:schemaRefs>
 </ds:datastoreItem>
+</file>
+
+<file path=customXml/itemProps2.xml><?xml version="1.0" encoding="utf-8"?>
+<ds:datastoreItem xmlns:ds="http://schemas.openxmlformats.org/officeDocument/2006/customXml" ds:itemID="{BAE466B8-72B2-4A90-80DF-05EB5AFED783}">
+  <ds:schemaRefs>
+    <ds:schemaRef ds:uri="http://schemas.microsoft.com/sharepoint/v3/contenttype/forms"/>
+  </ds:schemaRefs>
+</ds:datastoreItem>
+</file>
+
+<file path=customXml/itemProps3.xml><?xml version="1.0" encoding="utf-8"?>
+<ds:datastoreItem xmlns:ds="http://schemas.openxmlformats.org/officeDocument/2006/customXml" ds:itemID="{12155729-2BCB-47EF-AA23-D89073AFCE32}">
+  <ds:schemaRefs>
+    <ds:schemaRef ds:uri="http://schemas.microsoft.com/office/infopath/2007/PartnerControls"/>
+    <ds:schemaRef ds:uri="20ab0764-78d8-4a2e-b291-590abc6cbfc9"/>
+    <ds:schemaRef ds:uri="http://www.w3.org/XML/1998/namespace"/>
+    <ds:schemaRef ds:uri="http://purl.org/dc/elements/1.1/"/>
+    <ds:schemaRef ds:uri="2e6bbb0f-77ab-4622-9451-ccc736b8eff5"/>
+    <ds:schemaRef ds:uri="http://purl.org/dc/terms/"/>
+    <ds:schemaRef ds:uri="http://schemas.microsoft.com/office/2006/documentManagement/types"/>
+    <ds:schemaRef ds:uri="http://schemas.openxmlformats.org/package/2006/metadata/core-properties"/>
+    <ds:schemaRef ds:uri="http://purl.org/dc/dcmitype/"/>
+    <ds:schemaRef ds:uri="http://schemas.microsoft.com/office/2006/metadata/properties"/>
+  </ds:schemaRefs>
+</ds:datastoreItem>
 </file>
</xml_diff>